<commit_message>
figures updated with new tree. Figure legends added
</commit_message>
<xml_diff>
--- a/analysis/plots/fig2_20210515.pptx
+++ b/analysis/plots/fig2_20210515.pptx
@@ -243,7 +243,7 @@
           <a:p>
             <a:fld id="{3D0C0BDB-E8FF-A14A-8C5A-11852E201FC6}" type="datetimeFigureOut">
               <a:rPr lang="en-US" smtClean="0"/>
-              <a:t>7/29/21</a:t>
+              <a:t>7/30/21</a:t>
             </a:fld>
             <a:endParaRPr lang="en-US"/>
           </a:p>
@@ -413,7 +413,7 @@
           <a:p>
             <a:fld id="{3D0C0BDB-E8FF-A14A-8C5A-11852E201FC6}" type="datetimeFigureOut">
               <a:rPr lang="en-US" smtClean="0"/>
-              <a:t>7/29/21</a:t>
+              <a:t>7/30/21</a:t>
             </a:fld>
             <a:endParaRPr lang="en-US"/>
           </a:p>
@@ -593,7 +593,7 @@
           <a:p>
             <a:fld id="{3D0C0BDB-E8FF-A14A-8C5A-11852E201FC6}" type="datetimeFigureOut">
               <a:rPr lang="en-US" smtClean="0"/>
-              <a:t>7/29/21</a:t>
+              <a:t>7/30/21</a:t>
             </a:fld>
             <a:endParaRPr lang="en-US"/>
           </a:p>
@@ -763,7 +763,7 @@
           <a:p>
             <a:fld id="{3D0C0BDB-E8FF-A14A-8C5A-11852E201FC6}" type="datetimeFigureOut">
               <a:rPr lang="en-US" smtClean="0"/>
-              <a:t>7/29/21</a:t>
+              <a:t>7/30/21</a:t>
             </a:fld>
             <a:endParaRPr lang="en-US"/>
           </a:p>
@@ -1007,7 +1007,7 @@
           <a:p>
             <a:fld id="{3D0C0BDB-E8FF-A14A-8C5A-11852E201FC6}" type="datetimeFigureOut">
               <a:rPr lang="en-US" smtClean="0"/>
-              <a:t>7/29/21</a:t>
+              <a:t>7/30/21</a:t>
             </a:fld>
             <a:endParaRPr lang="en-US"/>
           </a:p>
@@ -1239,7 +1239,7 @@
           <a:p>
             <a:fld id="{3D0C0BDB-E8FF-A14A-8C5A-11852E201FC6}" type="datetimeFigureOut">
               <a:rPr lang="en-US" smtClean="0"/>
-              <a:t>7/29/21</a:t>
+              <a:t>7/30/21</a:t>
             </a:fld>
             <a:endParaRPr lang="en-US"/>
           </a:p>
@@ -1606,7 +1606,7 @@
           <a:p>
             <a:fld id="{3D0C0BDB-E8FF-A14A-8C5A-11852E201FC6}" type="datetimeFigureOut">
               <a:rPr lang="en-US" smtClean="0"/>
-              <a:t>7/29/21</a:t>
+              <a:t>7/30/21</a:t>
             </a:fld>
             <a:endParaRPr lang="en-US"/>
           </a:p>
@@ -1724,7 +1724,7 @@
           <a:p>
             <a:fld id="{3D0C0BDB-E8FF-A14A-8C5A-11852E201FC6}" type="datetimeFigureOut">
               <a:rPr lang="en-US" smtClean="0"/>
-              <a:t>7/29/21</a:t>
+              <a:t>7/30/21</a:t>
             </a:fld>
             <a:endParaRPr lang="en-US"/>
           </a:p>
@@ -1819,7 +1819,7 @@
           <a:p>
             <a:fld id="{3D0C0BDB-E8FF-A14A-8C5A-11852E201FC6}" type="datetimeFigureOut">
               <a:rPr lang="en-US" smtClean="0"/>
-              <a:t>7/29/21</a:t>
+              <a:t>7/30/21</a:t>
             </a:fld>
             <a:endParaRPr lang="en-US"/>
           </a:p>
@@ -2096,7 +2096,7 @@
           <a:p>
             <a:fld id="{3D0C0BDB-E8FF-A14A-8C5A-11852E201FC6}" type="datetimeFigureOut">
               <a:rPr lang="en-US" smtClean="0"/>
-              <a:t>7/29/21</a:t>
+              <a:t>7/30/21</a:t>
             </a:fld>
             <a:endParaRPr lang="en-US"/>
           </a:p>
@@ -2353,7 +2353,7 @@
           <a:p>
             <a:fld id="{3D0C0BDB-E8FF-A14A-8C5A-11852E201FC6}" type="datetimeFigureOut">
               <a:rPr lang="en-US" smtClean="0"/>
-              <a:t>7/29/21</a:t>
+              <a:t>7/30/21</a:t>
             </a:fld>
             <a:endParaRPr lang="en-US"/>
           </a:p>
@@ -2566,7 +2566,7 @@
           <a:p>
             <a:fld id="{3D0C0BDB-E8FF-A14A-8C5A-11852E201FC6}" type="datetimeFigureOut">
               <a:rPr lang="en-US" smtClean="0"/>
-              <a:t>7/29/21</a:t>
+              <a:t>7/30/21</a:t>
             </a:fld>
             <a:endParaRPr lang="en-US"/>
           </a:p>
@@ -2971,36 +2971,6 @@
           <a:chExt cx="0" cy="0"/>
         </a:xfrm>
       </p:grpSpPr>
-      <p:pic>
-        <p:nvPicPr>
-          <p:cNvPr id="10" name="Picture 9">
-            <a:extLst>
-              <a:ext uri="{FF2B5EF4-FFF2-40B4-BE49-F238E27FC236}">
-                <a16:creationId xmlns:a16="http://schemas.microsoft.com/office/drawing/2014/main" id="{130690B5-9C6D-8549-8627-4AFFBE37518C}"/>
-              </a:ext>
-            </a:extLst>
-          </p:cNvPr>
-          <p:cNvPicPr>
-            <a:picLocks noChangeAspect="1"/>
-          </p:cNvPicPr>
-          <p:nvPr/>
-        </p:nvPicPr>
-        <p:blipFill>
-          <a:blip r:embed="rId2"/>
-          <a:stretch>
-            <a:fillRect/>
-          </a:stretch>
-        </p:blipFill>
-        <p:spPr>
-          <a:xfrm>
-            <a:off x="0" y="2276571"/>
-            <a:ext cx="12192000" cy="3145005"/>
-          </a:xfrm>
-          <a:prstGeom prst="rect">
-            <a:avLst/>
-          </a:prstGeom>
-        </p:spPr>
-      </p:pic>
       <p:grpSp>
         <p:nvGrpSpPr>
           <p:cNvPr id="67" name="Group 66">
@@ -3036,7 +3006,7 @@
             <p:nvPr/>
           </p:nvPicPr>
           <p:blipFill>
-            <a:blip r:embed="rId3"/>
+            <a:blip r:embed="rId2"/>
             <a:stretch>
               <a:fillRect/>
             </a:stretch>
@@ -4295,10 +4265,40 @@
       </p:grpSp>
       <p:pic>
         <p:nvPicPr>
-          <p:cNvPr id="12" name="Picture 11">
+          <p:cNvPr id="3" name="Picture 2">
             <a:extLst>
               <a:ext uri="{FF2B5EF4-FFF2-40B4-BE49-F238E27FC236}">
-                <a16:creationId xmlns:a16="http://schemas.microsoft.com/office/drawing/2014/main" id="{D2BDCFE6-AE8E-8D40-BDFD-55F6C13CCB3A}"/>
+                <a16:creationId xmlns:a16="http://schemas.microsoft.com/office/drawing/2014/main" id="{55DC41A3-BBC3-E84C-BCB6-7BFB1E79F54A}"/>
+              </a:ext>
+            </a:extLst>
+          </p:cNvPr>
+          <p:cNvPicPr>
+            <a:picLocks noChangeAspect="1"/>
+          </p:cNvPicPr>
+          <p:nvPr/>
+        </p:nvPicPr>
+        <p:blipFill>
+          <a:blip r:embed="rId3"/>
+          <a:stretch>
+            <a:fillRect/>
+          </a:stretch>
+        </p:blipFill>
+        <p:spPr>
+          <a:xfrm>
+            <a:off x="0" y="2356929"/>
+            <a:ext cx="12192000" cy="3124073"/>
+          </a:xfrm>
+          <a:prstGeom prst="rect">
+            <a:avLst/>
+          </a:prstGeom>
+        </p:spPr>
+      </p:pic>
+      <p:pic>
+        <p:nvPicPr>
+          <p:cNvPr id="6" name="Picture 5">
+            <a:extLst>
+              <a:ext uri="{FF2B5EF4-FFF2-40B4-BE49-F238E27FC236}">
+                <a16:creationId xmlns:a16="http://schemas.microsoft.com/office/drawing/2014/main" id="{1818962F-4AEE-6947-9A9B-5C5D23DE3ACC}"/>
               </a:ext>
             </a:extLst>
           </p:cNvPr>
@@ -4315,7 +4315,7 @@
         </p:blipFill>
         <p:spPr>
           <a:xfrm>
-            <a:off x="-4002" y="5462216"/>
+            <a:off x="21861" y="5482525"/>
             <a:ext cx="12192000" cy="2975675"/>
           </a:xfrm>
           <a:prstGeom prst="rect">

</xml_diff>

<commit_message>
fig2 with 1000 iterations
</commit_message>
<xml_diff>
--- a/analysis/plots/fig2_20210515.pptx
+++ b/analysis/plots/fig2_20210515.pptx
@@ -243,7 +243,7 @@
           <a:p>
             <a:fld id="{3D0C0BDB-E8FF-A14A-8C5A-11852E201FC6}" type="datetimeFigureOut">
               <a:rPr lang="en-US" smtClean="0"/>
-              <a:t>7/30/21</a:t>
+              <a:t>8/2/21</a:t>
             </a:fld>
             <a:endParaRPr lang="en-US"/>
           </a:p>
@@ -413,7 +413,7 @@
           <a:p>
             <a:fld id="{3D0C0BDB-E8FF-A14A-8C5A-11852E201FC6}" type="datetimeFigureOut">
               <a:rPr lang="en-US" smtClean="0"/>
-              <a:t>7/30/21</a:t>
+              <a:t>8/2/21</a:t>
             </a:fld>
             <a:endParaRPr lang="en-US"/>
           </a:p>
@@ -593,7 +593,7 @@
           <a:p>
             <a:fld id="{3D0C0BDB-E8FF-A14A-8C5A-11852E201FC6}" type="datetimeFigureOut">
               <a:rPr lang="en-US" smtClean="0"/>
-              <a:t>7/30/21</a:t>
+              <a:t>8/2/21</a:t>
             </a:fld>
             <a:endParaRPr lang="en-US"/>
           </a:p>
@@ -763,7 +763,7 @@
           <a:p>
             <a:fld id="{3D0C0BDB-E8FF-A14A-8C5A-11852E201FC6}" type="datetimeFigureOut">
               <a:rPr lang="en-US" smtClean="0"/>
-              <a:t>7/30/21</a:t>
+              <a:t>8/2/21</a:t>
             </a:fld>
             <a:endParaRPr lang="en-US"/>
           </a:p>
@@ -1007,7 +1007,7 @@
           <a:p>
             <a:fld id="{3D0C0BDB-E8FF-A14A-8C5A-11852E201FC6}" type="datetimeFigureOut">
               <a:rPr lang="en-US" smtClean="0"/>
-              <a:t>7/30/21</a:t>
+              <a:t>8/2/21</a:t>
             </a:fld>
             <a:endParaRPr lang="en-US"/>
           </a:p>
@@ -1239,7 +1239,7 @@
           <a:p>
             <a:fld id="{3D0C0BDB-E8FF-A14A-8C5A-11852E201FC6}" type="datetimeFigureOut">
               <a:rPr lang="en-US" smtClean="0"/>
-              <a:t>7/30/21</a:t>
+              <a:t>8/2/21</a:t>
             </a:fld>
             <a:endParaRPr lang="en-US"/>
           </a:p>
@@ -1606,7 +1606,7 @@
           <a:p>
             <a:fld id="{3D0C0BDB-E8FF-A14A-8C5A-11852E201FC6}" type="datetimeFigureOut">
               <a:rPr lang="en-US" smtClean="0"/>
-              <a:t>7/30/21</a:t>
+              <a:t>8/2/21</a:t>
             </a:fld>
             <a:endParaRPr lang="en-US"/>
           </a:p>
@@ -1724,7 +1724,7 @@
           <a:p>
             <a:fld id="{3D0C0BDB-E8FF-A14A-8C5A-11852E201FC6}" type="datetimeFigureOut">
               <a:rPr lang="en-US" smtClean="0"/>
-              <a:t>7/30/21</a:t>
+              <a:t>8/2/21</a:t>
             </a:fld>
             <a:endParaRPr lang="en-US"/>
           </a:p>
@@ -1819,7 +1819,7 @@
           <a:p>
             <a:fld id="{3D0C0BDB-E8FF-A14A-8C5A-11852E201FC6}" type="datetimeFigureOut">
               <a:rPr lang="en-US" smtClean="0"/>
-              <a:t>7/30/21</a:t>
+              <a:t>8/2/21</a:t>
             </a:fld>
             <a:endParaRPr lang="en-US"/>
           </a:p>
@@ -2096,7 +2096,7 @@
           <a:p>
             <a:fld id="{3D0C0BDB-E8FF-A14A-8C5A-11852E201FC6}" type="datetimeFigureOut">
               <a:rPr lang="en-US" smtClean="0"/>
-              <a:t>7/30/21</a:t>
+              <a:t>8/2/21</a:t>
             </a:fld>
             <a:endParaRPr lang="en-US"/>
           </a:p>
@@ -2353,7 +2353,7 @@
           <a:p>
             <a:fld id="{3D0C0BDB-E8FF-A14A-8C5A-11852E201FC6}" type="datetimeFigureOut">
               <a:rPr lang="en-US" smtClean="0"/>
-              <a:t>7/30/21</a:t>
+              <a:t>8/2/21</a:t>
             </a:fld>
             <a:endParaRPr lang="en-US"/>
           </a:p>
@@ -2566,7 +2566,7 @@
           <a:p>
             <a:fld id="{3D0C0BDB-E8FF-A14A-8C5A-11852E201FC6}" type="datetimeFigureOut">
               <a:rPr lang="en-US" smtClean="0"/>
-              <a:t>7/30/21</a:t>
+              <a:t>8/2/21</a:t>
             </a:fld>
             <a:endParaRPr lang="en-US"/>
           </a:p>
@@ -4265,10 +4265,10 @@
       </p:grpSp>
       <p:pic>
         <p:nvPicPr>
-          <p:cNvPr id="3" name="Picture 2">
+          <p:cNvPr id="4" name="Picture 3">
             <a:extLst>
               <a:ext uri="{FF2B5EF4-FFF2-40B4-BE49-F238E27FC236}">
-                <a16:creationId xmlns:a16="http://schemas.microsoft.com/office/drawing/2014/main" id="{55DC41A3-BBC3-E84C-BCB6-7BFB1E79F54A}"/>
+                <a16:creationId xmlns:a16="http://schemas.microsoft.com/office/drawing/2014/main" id="{C87C8356-34BF-C248-A92B-02AD47F59FBF}"/>
               </a:ext>
             </a:extLst>
           </p:cNvPr>
@@ -4285,8 +4285,8 @@
         </p:blipFill>
         <p:spPr>
           <a:xfrm>
-            <a:off x="0" y="2356929"/>
-            <a:ext cx="12192000" cy="3124073"/>
+            <a:off x="0" y="2377057"/>
+            <a:ext cx="12192000" cy="3126674"/>
           </a:xfrm>
           <a:prstGeom prst="rect">
             <a:avLst/>
@@ -4295,10 +4295,10 @@
       </p:pic>
       <p:pic>
         <p:nvPicPr>
-          <p:cNvPr id="6" name="Picture 5">
+          <p:cNvPr id="8" name="Picture 7">
             <a:extLst>
               <a:ext uri="{FF2B5EF4-FFF2-40B4-BE49-F238E27FC236}">
-                <a16:creationId xmlns:a16="http://schemas.microsoft.com/office/drawing/2014/main" id="{1818962F-4AEE-6947-9A9B-5C5D23DE3ACC}"/>
+                <a16:creationId xmlns:a16="http://schemas.microsoft.com/office/drawing/2014/main" id="{4622B73B-5FD5-8C44-BA31-EDB3B775818C}"/>
               </a:ext>
             </a:extLst>
           </p:cNvPr>
@@ -4315,7 +4315,7 @@
         </p:blipFill>
         <p:spPr>
           <a:xfrm>
-            <a:off x="21861" y="5482525"/>
+            <a:off x="0" y="5482525"/>
             <a:ext cx="12192000" cy="2975675"/>
           </a:xfrm>
           <a:prstGeom prst="rect">

</xml_diff>

<commit_message>
add fig 2: dn/ds. change figure order
</commit_message>
<xml_diff>
--- a/analysis/plots/fig2_20210515.pptx
+++ b/analysis/plots/fig2_20210515.pptx
@@ -2,12 +2,12 @@
 <file path=ppt/presentation.xml><?xml version="1.0" encoding="utf-8"?>
 <p:presentation xmlns:a="http://schemas.openxmlformats.org/drawingml/2006/main" xmlns:r="http://schemas.openxmlformats.org/officeDocument/2006/relationships" xmlns:p="http://schemas.openxmlformats.org/presentationml/2006/main" saveSubsetFonts="1" autoCompressPictures="0">
   <p:sldMasterIdLst>
-    <p:sldMasterId id="2147483672" r:id="rId1"/>
+    <p:sldMasterId id="2147483720" r:id="rId1"/>
   </p:sldMasterIdLst>
   <p:sldIdLst>
     <p:sldId id="256" r:id="rId2"/>
   </p:sldIdLst>
-  <p:sldSz cx="12192000" cy="8458200"/>
+  <p:sldSz cx="6629400" cy="4343400"/>
   <p:notesSz cx="6858000" cy="9144000"/>
   <p:defaultTextStyle>
     <a:defPPr>
@@ -104,11 +104,6 @@
       </a:defRPr>
     </a:lvl9pPr>
   </p:defaultTextStyle>
-  <p:extLst>
-    <p:ext uri="{EFAFB233-063F-42B5-8137-9DF3F51BA10A}">
-      <p15:sldGuideLst xmlns:p15="http://schemas.microsoft.com/office/powerpoint/2012/main"/>
-    </p:ext>
-  </p:extLst>
 </p:presentation>
 </file>
 
@@ -141,15 +136,15 @@
         </p:nvSpPr>
         <p:spPr>
           <a:xfrm>
-            <a:off x="914400" y="1384248"/>
-            <a:ext cx="10363200" cy="2944707"/>
+            <a:off x="497205" y="710830"/>
+            <a:ext cx="5634990" cy="1512147"/>
           </a:xfrm>
         </p:spPr>
         <p:txBody>
           <a:bodyPr anchor="b"/>
           <a:lstStyle>
             <a:lvl1pPr algn="ctr">
-              <a:defRPr sz="7400"/>
+              <a:defRPr sz="3800"/>
             </a:lvl1pPr>
           </a:lstStyle>
           <a:p>
@@ -173,8 +168,8 @@
         </p:nvSpPr>
         <p:spPr>
           <a:xfrm>
-            <a:off x="1524000" y="4442514"/>
-            <a:ext cx="9144000" cy="2042106"/>
+            <a:off x="828675" y="2281291"/>
+            <a:ext cx="4972050" cy="1048649"/>
           </a:xfrm>
         </p:spPr>
         <p:txBody>
@@ -182,39 +177,39 @@
           <a:lstStyle>
             <a:lvl1pPr marL="0" indent="0" algn="ctr">
               <a:buNone/>
-              <a:defRPr sz="2960"/>
+              <a:defRPr sz="1520"/>
             </a:lvl1pPr>
-            <a:lvl2pPr marL="563865" indent="0" algn="ctr">
-              <a:buNone/>
-              <a:defRPr sz="2467"/>
+            <a:lvl2pPr marL="289545" indent="0" algn="ctr">
+              <a:buNone/>
+              <a:defRPr sz="1267"/>
             </a:lvl2pPr>
-            <a:lvl3pPr marL="1127730" indent="0" algn="ctr">
-              <a:buNone/>
-              <a:defRPr sz="2220"/>
+            <a:lvl3pPr marL="579090" indent="0" algn="ctr">
+              <a:buNone/>
+              <a:defRPr sz="1140"/>
             </a:lvl3pPr>
-            <a:lvl4pPr marL="1691594" indent="0" algn="ctr">
-              <a:buNone/>
-              <a:defRPr sz="1973"/>
+            <a:lvl4pPr marL="868634" indent="0" algn="ctr">
+              <a:buNone/>
+              <a:defRPr sz="1013"/>
             </a:lvl4pPr>
-            <a:lvl5pPr marL="2255459" indent="0" algn="ctr">
-              <a:buNone/>
-              <a:defRPr sz="1973"/>
+            <a:lvl5pPr marL="1158179" indent="0" algn="ctr">
+              <a:buNone/>
+              <a:defRPr sz="1013"/>
             </a:lvl5pPr>
-            <a:lvl6pPr marL="2819324" indent="0" algn="ctr">
-              <a:buNone/>
-              <a:defRPr sz="1973"/>
+            <a:lvl6pPr marL="1447724" indent="0" algn="ctr">
+              <a:buNone/>
+              <a:defRPr sz="1013"/>
             </a:lvl6pPr>
-            <a:lvl7pPr marL="3383189" indent="0" algn="ctr">
-              <a:buNone/>
-              <a:defRPr sz="1973"/>
+            <a:lvl7pPr marL="1737269" indent="0" algn="ctr">
+              <a:buNone/>
+              <a:defRPr sz="1013"/>
             </a:lvl7pPr>
-            <a:lvl8pPr marL="3947053" indent="0" algn="ctr">
-              <a:buNone/>
-              <a:defRPr sz="1973"/>
+            <a:lvl8pPr marL="2026813" indent="0" algn="ctr">
+              <a:buNone/>
+              <a:defRPr sz="1013"/>
             </a:lvl8pPr>
-            <a:lvl9pPr marL="4510918" indent="0" algn="ctr">
-              <a:buNone/>
-              <a:defRPr sz="1973"/>
+            <a:lvl9pPr marL="2316358" indent="0" algn="ctr">
+              <a:buNone/>
+              <a:defRPr sz="1013"/>
             </a:lvl9pPr>
           </a:lstStyle>
           <a:p>
@@ -241,9 +236,9 @@
           <a:bodyPr/>
           <a:lstStyle/>
           <a:p>
-            <a:fld id="{3D0C0BDB-E8FF-A14A-8C5A-11852E201FC6}" type="datetimeFigureOut">
+            <a:fld id="{FC91AAE3-157E-D849-B0EB-D94F4CACFBD1}" type="datetimeFigureOut">
               <a:rPr lang="en-US" smtClean="0"/>
-              <a:t>8/2/21</a:t>
+              <a:t>8/10/21</a:t>
             </a:fld>
             <a:endParaRPr lang="en-US"/>
           </a:p>
@@ -283,7 +278,7 @@
           <a:bodyPr/>
           <a:lstStyle/>
           <a:p>
-            <a:fld id="{85A85A65-78AA-FE46-A2A3-634EFA88EC90}" type="slidenum">
+            <a:fld id="{FC0D9FB1-8EF9-A548-9CF2-3ABB4CF1D426}" type="slidenum">
               <a:rPr lang="en-US" smtClean="0"/>
               <a:t>‹#›</a:t>
             </a:fld>
@@ -294,7 +289,7 @@
     </p:spTree>
     <p:extLst>
       <p:ext uri="{BB962C8B-B14F-4D97-AF65-F5344CB8AC3E}">
-        <p14:creationId xmlns:p14="http://schemas.microsoft.com/office/powerpoint/2010/main" val="2542768548"/>
+        <p14:creationId xmlns:p14="http://schemas.microsoft.com/office/powerpoint/2010/main" val="3425324782"/>
       </p:ext>
     </p:extLst>
   </p:cSld>
@@ -411,9 +406,9 @@
           <a:bodyPr/>
           <a:lstStyle/>
           <a:p>
-            <a:fld id="{3D0C0BDB-E8FF-A14A-8C5A-11852E201FC6}" type="datetimeFigureOut">
+            <a:fld id="{FC91AAE3-157E-D849-B0EB-D94F4CACFBD1}" type="datetimeFigureOut">
               <a:rPr lang="en-US" smtClean="0"/>
-              <a:t>8/2/21</a:t>
+              <a:t>8/10/21</a:t>
             </a:fld>
             <a:endParaRPr lang="en-US"/>
           </a:p>
@@ -453,7 +448,7 @@
           <a:bodyPr/>
           <a:lstStyle/>
           <a:p>
-            <a:fld id="{85A85A65-78AA-FE46-A2A3-634EFA88EC90}" type="slidenum">
+            <a:fld id="{FC0D9FB1-8EF9-A548-9CF2-3ABB4CF1D426}" type="slidenum">
               <a:rPr lang="en-US" smtClean="0"/>
               <a:t>‹#›</a:t>
             </a:fld>
@@ -464,7 +459,7 @@
     </p:spTree>
     <p:extLst>
       <p:ext uri="{BB962C8B-B14F-4D97-AF65-F5344CB8AC3E}">
-        <p14:creationId xmlns:p14="http://schemas.microsoft.com/office/powerpoint/2010/main" val="815647526"/>
+        <p14:creationId xmlns:p14="http://schemas.microsoft.com/office/powerpoint/2010/main" val="1465740039"/>
       </p:ext>
     </p:extLst>
   </p:cSld>
@@ -503,8 +498,8 @@
         </p:nvSpPr>
         <p:spPr>
           <a:xfrm>
-            <a:off x="8724901" y="450321"/>
-            <a:ext cx="2628900" cy="7167934"/>
+            <a:off x="4744165" y="231246"/>
+            <a:ext cx="1429464" cy="3680831"/>
           </a:xfrm>
         </p:spPr>
         <p:txBody>
@@ -531,8 +526,8 @@
         </p:nvSpPr>
         <p:spPr>
           <a:xfrm>
-            <a:off x="838201" y="450321"/>
-            <a:ext cx="7734300" cy="7167934"/>
+            <a:off x="455771" y="231246"/>
+            <a:ext cx="4205526" cy="3680831"/>
           </a:xfrm>
         </p:spPr>
         <p:txBody>
@@ -591,9 +586,9 @@
           <a:bodyPr/>
           <a:lstStyle/>
           <a:p>
-            <a:fld id="{3D0C0BDB-E8FF-A14A-8C5A-11852E201FC6}" type="datetimeFigureOut">
+            <a:fld id="{FC91AAE3-157E-D849-B0EB-D94F4CACFBD1}" type="datetimeFigureOut">
               <a:rPr lang="en-US" smtClean="0"/>
-              <a:t>8/2/21</a:t>
+              <a:t>8/10/21</a:t>
             </a:fld>
             <a:endParaRPr lang="en-US"/>
           </a:p>
@@ -633,7 +628,7 @@
           <a:bodyPr/>
           <a:lstStyle/>
           <a:p>
-            <a:fld id="{85A85A65-78AA-FE46-A2A3-634EFA88EC90}" type="slidenum">
+            <a:fld id="{FC0D9FB1-8EF9-A548-9CF2-3ABB4CF1D426}" type="slidenum">
               <a:rPr lang="en-US" smtClean="0"/>
               <a:t>‹#›</a:t>
             </a:fld>
@@ -644,7 +639,7 @@
     </p:spTree>
     <p:extLst>
       <p:ext uri="{BB962C8B-B14F-4D97-AF65-F5344CB8AC3E}">
-        <p14:creationId xmlns:p14="http://schemas.microsoft.com/office/powerpoint/2010/main" val="187712529"/>
+        <p14:creationId xmlns:p14="http://schemas.microsoft.com/office/powerpoint/2010/main" val="198814255"/>
       </p:ext>
     </p:extLst>
   </p:cSld>
@@ -761,9 +756,9 @@
           <a:bodyPr/>
           <a:lstStyle/>
           <a:p>
-            <a:fld id="{3D0C0BDB-E8FF-A14A-8C5A-11852E201FC6}" type="datetimeFigureOut">
+            <a:fld id="{FC91AAE3-157E-D849-B0EB-D94F4CACFBD1}" type="datetimeFigureOut">
               <a:rPr lang="en-US" smtClean="0"/>
-              <a:t>8/2/21</a:t>
+              <a:t>8/10/21</a:t>
             </a:fld>
             <a:endParaRPr lang="en-US"/>
           </a:p>
@@ -803,7 +798,7 @@
           <a:bodyPr/>
           <a:lstStyle/>
           <a:p>
-            <a:fld id="{85A85A65-78AA-FE46-A2A3-634EFA88EC90}" type="slidenum">
+            <a:fld id="{FC0D9FB1-8EF9-A548-9CF2-3ABB4CF1D426}" type="slidenum">
               <a:rPr lang="en-US" smtClean="0"/>
               <a:t>‹#›</a:t>
             </a:fld>
@@ -814,7 +809,7 @@
     </p:spTree>
     <p:extLst>
       <p:ext uri="{BB962C8B-B14F-4D97-AF65-F5344CB8AC3E}">
-        <p14:creationId xmlns:p14="http://schemas.microsoft.com/office/powerpoint/2010/main" val="1416713398"/>
+        <p14:creationId xmlns:p14="http://schemas.microsoft.com/office/powerpoint/2010/main" val="649594460"/>
       </p:ext>
     </p:extLst>
   </p:cSld>
@@ -853,15 +848,15 @@
         </p:nvSpPr>
         <p:spPr>
           <a:xfrm>
-            <a:off x="831851" y="2108679"/>
-            <a:ext cx="10515600" cy="3518376"/>
+            <a:off x="452319" y="1082835"/>
+            <a:ext cx="5717858" cy="1806733"/>
           </a:xfrm>
         </p:spPr>
         <p:txBody>
           <a:bodyPr anchor="b"/>
           <a:lstStyle>
             <a:lvl1pPr>
-              <a:defRPr sz="7400"/>
+              <a:defRPr sz="3800"/>
             </a:lvl1pPr>
           </a:lstStyle>
           <a:p>
@@ -885,8 +880,8 @@
         </p:nvSpPr>
         <p:spPr>
           <a:xfrm>
-            <a:off x="831851" y="5660339"/>
-            <a:ext cx="10515600" cy="1850231"/>
+            <a:off x="452319" y="2906661"/>
+            <a:ext cx="5717858" cy="950118"/>
           </a:xfrm>
         </p:spPr>
         <p:txBody>
@@ -894,15 +889,15 @@
           <a:lstStyle>
             <a:lvl1pPr marL="0" indent="0">
               <a:buNone/>
-              <a:defRPr sz="2960">
+              <a:defRPr sz="1520">
                 <a:solidFill>
                   <a:schemeClr val="tx1"/>
                 </a:solidFill>
               </a:defRPr>
             </a:lvl1pPr>
-            <a:lvl2pPr marL="563865" indent="0">
-              <a:buNone/>
-              <a:defRPr sz="2467">
+            <a:lvl2pPr marL="289545" indent="0">
+              <a:buNone/>
+              <a:defRPr sz="1267">
                 <a:solidFill>
                   <a:schemeClr val="tx1">
                     <a:tint val="75000"/>
@@ -910,9 +905,9 @@
                 </a:solidFill>
               </a:defRPr>
             </a:lvl2pPr>
-            <a:lvl3pPr marL="1127730" indent="0">
-              <a:buNone/>
-              <a:defRPr sz="2220">
+            <a:lvl3pPr marL="579090" indent="0">
+              <a:buNone/>
+              <a:defRPr sz="1140">
                 <a:solidFill>
                   <a:schemeClr val="tx1">
                     <a:tint val="75000"/>
@@ -920,9 +915,9 @@
                 </a:solidFill>
               </a:defRPr>
             </a:lvl3pPr>
-            <a:lvl4pPr marL="1691594" indent="0">
-              <a:buNone/>
-              <a:defRPr sz="1973">
+            <a:lvl4pPr marL="868634" indent="0">
+              <a:buNone/>
+              <a:defRPr sz="1013">
                 <a:solidFill>
                   <a:schemeClr val="tx1">
                     <a:tint val="75000"/>
@@ -930,9 +925,9 @@
                 </a:solidFill>
               </a:defRPr>
             </a:lvl4pPr>
-            <a:lvl5pPr marL="2255459" indent="0">
-              <a:buNone/>
-              <a:defRPr sz="1973">
+            <a:lvl5pPr marL="1158179" indent="0">
+              <a:buNone/>
+              <a:defRPr sz="1013">
                 <a:solidFill>
                   <a:schemeClr val="tx1">
                     <a:tint val="75000"/>
@@ -940,9 +935,9 @@
                 </a:solidFill>
               </a:defRPr>
             </a:lvl5pPr>
-            <a:lvl6pPr marL="2819324" indent="0">
-              <a:buNone/>
-              <a:defRPr sz="1973">
+            <a:lvl6pPr marL="1447724" indent="0">
+              <a:buNone/>
+              <a:defRPr sz="1013">
                 <a:solidFill>
                   <a:schemeClr val="tx1">
                     <a:tint val="75000"/>
@@ -950,9 +945,9 @@
                 </a:solidFill>
               </a:defRPr>
             </a:lvl6pPr>
-            <a:lvl7pPr marL="3383189" indent="0">
-              <a:buNone/>
-              <a:defRPr sz="1973">
+            <a:lvl7pPr marL="1737269" indent="0">
+              <a:buNone/>
+              <a:defRPr sz="1013">
                 <a:solidFill>
                   <a:schemeClr val="tx1">
                     <a:tint val="75000"/>
@@ -960,9 +955,9 @@
                 </a:solidFill>
               </a:defRPr>
             </a:lvl7pPr>
-            <a:lvl8pPr marL="3947053" indent="0">
-              <a:buNone/>
-              <a:defRPr sz="1973">
+            <a:lvl8pPr marL="2026813" indent="0">
+              <a:buNone/>
+              <a:defRPr sz="1013">
                 <a:solidFill>
                   <a:schemeClr val="tx1">
                     <a:tint val="75000"/>
@@ -970,9 +965,9 @@
                 </a:solidFill>
               </a:defRPr>
             </a:lvl8pPr>
-            <a:lvl9pPr marL="4510918" indent="0">
-              <a:buNone/>
-              <a:defRPr sz="1973">
+            <a:lvl9pPr marL="2316358" indent="0">
+              <a:buNone/>
+              <a:defRPr sz="1013">
                 <a:solidFill>
                   <a:schemeClr val="tx1">
                     <a:tint val="75000"/>
@@ -1005,9 +1000,9 @@
           <a:bodyPr/>
           <a:lstStyle/>
           <a:p>
-            <a:fld id="{3D0C0BDB-E8FF-A14A-8C5A-11852E201FC6}" type="datetimeFigureOut">
+            <a:fld id="{FC91AAE3-157E-D849-B0EB-D94F4CACFBD1}" type="datetimeFigureOut">
               <a:rPr lang="en-US" smtClean="0"/>
-              <a:t>8/2/21</a:t>
+              <a:t>8/10/21</a:t>
             </a:fld>
             <a:endParaRPr lang="en-US"/>
           </a:p>
@@ -1047,7 +1042,7 @@
           <a:bodyPr/>
           <a:lstStyle/>
           <a:p>
-            <a:fld id="{85A85A65-78AA-FE46-A2A3-634EFA88EC90}" type="slidenum">
+            <a:fld id="{FC0D9FB1-8EF9-A548-9CF2-3ABB4CF1D426}" type="slidenum">
               <a:rPr lang="en-US" smtClean="0"/>
               <a:t>‹#›</a:t>
             </a:fld>
@@ -1058,7 +1053,7 @@
     </p:spTree>
     <p:extLst>
       <p:ext uri="{BB962C8B-B14F-4D97-AF65-F5344CB8AC3E}">
-        <p14:creationId xmlns:p14="http://schemas.microsoft.com/office/powerpoint/2010/main" val="3915797352"/>
+        <p14:creationId xmlns:p14="http://schemas.microsoft.com/office/powerpoint/2010/main" val="917346300"/>
       </p:ext>
     </p:extLst>
   </p:cSld>
@@ -1120,8 +1115,8 @@
         </p:nvSpPr>
         <p:spPr>
           <a:xfrm>
-            <a:off x="838200" y="2251604"/>
-            <a:ext cx="5181600" cy="5366650"/>
+            <a:off x="455771" y="1156229"/>
+            <a:ext cx="2817495" cy="2755847"/>
           </a:xfrm>
         </p:spPr>
         <p:txBody>
@@ -1177,8 +1172,8 @@
         </p:nvSpPr>
         <p:spPr>
           <a:xfrm>
-            <a:off x="6172200" y="2251604"/>
-            <a:ext cx="5181600" cy="5366650"/>
+            <a:off x="3356134" y="1156229"/>
+            <a:ext cx="2817495" cy="2755847"/>
           </a:xfrm>
         </p:spPr>
         <p:txBody>
@@ -1237,9 +1232,9 @@
           <a:bodyPr/>
           <a:lstStyle/>
           <a:p>
-            <a:fld id="{3D0C0BDB-E8FF-A14A-8C5A-11852E201FC6}" type="datetimeFigureOut">
+            <a:fld id="{FC91AAE3-157E-D849-B0EB-D94F4CACFBD1}" type="datetimeFigureOut">
               <a:rPr lang="en-US" smtClean="0"/>
-              <a:t>8/2/21</a:t>
+              <a:t>8/10/21</a:t>
             </a:fld>
             <a:endParaRPr lang="en-US"/>
           </a:p>
@@ -1279,7 +1274,7 @@
           <a:bodyPr/>
           <a:lstStyle/>
           <a:p>
-            <a:fld id="{85A85A65-78AA-FE46-A2A3-634EFA88EC90}" type="slidenum">
+            <a:fld id="{FC0D9FB1-8EF9-A548-9CF2-3ABB4CF1D426}" type="slidenum">
               <a:rPr lang="en-US" smtClean="0"/>
               <a:t>‹#›</a:t>
             </a:fld>
@@ -1290,7 +1285,7 @@
     </p:spTree>
     <p:extLst>
       <p:ext uri="{BB962C8B-B14F-4D97-AF65-F5344CB8AC3E}">
-        <p14:creationId xmlns:p14="http://schemas.microsoft.com/office/powerpoint/2010/main" val="3443046173"/>
+        <p14:creationId xmlns:p14="http://schemas.microsoft.com/office/powerpoint/2010/main" val="253089953"/>
       </p:ext>
     </p:extLst>
   </p:cSld>
@@ -1329,8 +1324,8 @@
         </p:nvSpPr>
         <p:spPr>
           <a:xfrm>
-            <a:off x="839788" y="450323"/>
-            <a:ext cx="10515600" cy="1634861"/>
+            <a:off x="456634" y="231247"/>
+            <a:ext cx="5717858" cy="839523"/>
           </a:xfrm>
         </p:spPr>
         <p:txBody>
@@ -1357,8 +1352,8 @@
         </p:nvSpPr>
         <p:spPr>
           <a:xfrm>
-            <a:off x="839789" y="2073434"/>
-            <a:ext cx="5157787" cy="1016158"/>
+            <a:off x="456635" y="1064737"/>
+            <a:ext cx="2804547" cy="521811"/>
           </a:xfrm>
         </p:spPr>
         <p:txBody>
@@ -1366,39 +1361,39 @@
           <a:lstStyle>
             <a:lvl1pPr marL="0" indent="0">
               <a:buNone/>
-              <a:defRPr sz="2960" b="1"/>
+              <a:defRPr sz="1520" b="1"/>
             </a:lvl1pPr>
-            <a:lvl2pPr marL="563865" indent="0">
-              <a:buNone/>
-              <a:defRPr sz="2467" b="1"/>
+            <a:lvl2pPr marL="289545" indent="0">
+              <a:buNone/>
+              <a:defRPr sz="1267" b="1"/>
             </a:lvl2pPr>
-            <a:lvl3pPr marL="1127730" indent="0">
-              <a:buNone/>
-              <a:defRPr sz="2220" b="1"/>
+            <a:lvl3pPr marL="579090" indent="0">
+              <a:buNone/>
+              <a:defRPr sz="1140" b="1"/>
             </a:lvl3pPr>
-            <a:lvl4pPr marL="1691594" indent="0">
-              <a:buNone/>
-              <a:defRPr sz="1973" b="1"/>
+            <a:lvl4pPr marL="868634" indent="0">
+              <a:buNone/>
+              <a:defRPr sz="1013" b="1"/>
             </a:lvl4pPr>
-            <a:lvl5pPr marL="2255459" indent="0">
-              <a:buNone/>
-              <a:defRPr sz="1973" b="1"/>
+            <a:lvl5pPr marL="1158179" indent="0">
+              <a:buNone/>
+              <a:defRPr sz="1013" b="1"/>
             </a:lvl5pPr>
-            <a:lvl6pPr marL="2819324" indent="0">
-              <a:buNone/>
-              <a:defRPr sz="1973" b="1"/>
+            <a:lvl6pPr marL="1447724" indent="0">
+              <a:buNone/>
+              <a:defRPr sz="1013" b="1"/>
             </a:lvl6pPr>
-            <a:lvl7pPr marL="3383189" indent="0">
-              <a:buNone/>
-              <a:defRPr sz="1973" b="1"/>
+            <a:lvl7pPr marL="1737269" indent="0">
+              <a:buNone/>
+              <a:defRPr sz="1013" b="1"/>
             </a:lvl7pPr>
-            <a:lvl8pPr marL="3947053" indent="0">
-              <a:buNone/>
-              <a:defRPr sz="1973" b="1"/>
+            <a:lvl8pPr marL="2026813" indent="0">
+              <a:buNone/>
+              <a:defRPr sz="1013" b="1"/>
             </a:lvl8pPr>
-            <a:lvl9pPr marL="4510918" indent="0">
-              <a:buNone/>
-              <a:defRPr sz="1973" b="1"/>
+            <a:lvl9pPr marL="2316358" indent="0">
+              <a:buNone/>
+              <a:defRPr sz="1013" b="1"/>
             </a:lvl9pPr>
           </a:lstStyle>
           <a:p>
@@ -1422,8 +1417,8 @@
         </p:nvSpPr>
         <p:spPr>
           <a:xfrm>
-            <a:off x="839789" y="3089593"/>
-            <a:ext cx="5157787" cy="4544325"/>
+            <a:off x="456635" y="1586548"/>
+            <a:ext cx="2804547" cy="2333572"/>
           </a:xfrm>
         </p:spPr>
         <p:txBody>
@@ -1479,8 +1474,8 @@
         </p:nvSpPr>
         <p:spPr>
           <a:xfrm>
-            <a:off x="6172201" y="2073434"/>
-            <a:ext cx="5183188" cy="1016158"/>
+            <a:off x="3356134" y="1064737"/>
+            <a:ext cx="2818358" cy="521811"/>
           </a:xfrm>
         </p:spPr>
         <p:txBody>
@@ -1488,39 +1483,39 @@
           <a:lstStyle>
             <a:lvl1pPr marL="0" indent="0">
               <a:buNone/>
-              <a:defRPr sz="2960" b="1"/>
+              <a:defRPr sz="1520" b="1"/>
             </a:lvl1pPr>
-            <a:lvl2pPr marL="563865" indent="0">
-              <a:buNone/>
-              <a:defRPr sz="2467" b="1"/>
+            <a:lvl2pPr marL="289545" indent="0">
+              <a:buNone/>
+              <a:defRPr sz="1267" b="1"/>
             </a:lvl2pPr>
-            <a:lvl3pPr marL="1127730" indent="0">
-              <a:buNone/>
-              <a:defRPr sz="2220" b="1"/>
+            <a:lvl3pPr marL="579090" indent="0">
+              <a:buNone/>
+              <a:defRPr sz="1140" b="1"/>
             </a:lvl3pPr>
-            <a:lvl4pPr marL="1691594" indent="0">
-              <a:buNone/>
-              <a:defRPr sz="1973" b="1"/>
+            <a:lvl4pPr marL="868634" indent="0">
+              <a:buNone/>
+              <a:defRPr sz="1013" b="1"/>
             </a:lvl4pPr>
-            <a:lvl5pPr marL="2255459" indent="0">
-              <a:buNone/>
-              <a:defRPr sz="1973" b="1"/>
+            <a:lvl5pPr marL="1158179" indent="0">
+              <a:buNone/>
+              <a:defRPr sz="1013" b="1"/>
             </a:lvl5pPr>
-            <a:lvl6pPr marL="2819324" indent="0">
-              <a:buNone/>
-              <a:defRPr sz="1973" b="1"/>
+            <a:lvl6pPr marL="1447724" indent="0">
+              <a:buNone/>
+              <a:defRPr sz="1013" b="1"/>
             </a:lvl6pPr>
-            <a:lvl7pPr marL="3383189" indent="0">
-              <a:buNone/>
-              <a:defRPr sz="1973" b="1"/>
+            <a:lvl7pPr marL="1737269" indent="0">
+              <a:buNone/>
+              <a:defRPr sz="1013" b="1"/>
             </a:lvl7pPr>
-            <a:lvl8pPr marL="3947053" indent="0">
-              <a:buNone/>
-              <a:defRPr sz="1973" b="1"/>
+            <a:lvl8pPr marL="2026813" indent="0">
+              <a:buNone/>
+              <a:defRPr sz="1013" b="1"/>
             </a:lvl8pPr>
-            <a:lvl9pPr marL="4510918" indent="0">
-              <a:buNone/>
-              <a:defRPr sz="1973" b="1"/>
+            <a:lvl9pPr marL="2316358" indent="0">
+              <a:buNone/>
+              <a:defRPr sz="1013" b="1"/>
             </a:lvl9pPr>
           </a:lstStyle>
           <a:p>
@@ -1544,8 +1539,8 @@
         </p:nvSpPr>
         <p:spPr>
           <a:xfrm>
-            <a:off x="6172201" y="3089593"/>
-            <a:ext cx="5183188" cy="4544325"/>
+            <a:off x="3356134" y="1586548"/>
+            <a:ext cx="2818358" cy="2333572"/>
           </a:xfrm>
         </p:spPr>
         <p:txBody>
@@ -1604,9 +1599,9 @@
           <a:bodyPr/>
           <a:lstStyle/>
           <a:p>
-            <a:fld id="{3D0C0BDB-E8FF-A14A-8C5A-11852E201FC6}" type="datetimeFigureOut">
+            <a:fld id="{FC91AAE3-157E-D849-B0EB-D94F4CACFBD1}" type="datetimeFigureOut">
               <a:rPr lang="en-US" smtClean="0"/>
-              <a:t>8/2/21</a:t>
+              <a:t>8/10/21</a:t>
             </a:fld>
             <a:endParaRPr lang="en-US"/>
           </a:p>
@@ -1646,7 +1641,7 @@
           <a:bodyPr/>
           <a:lstStyle/>
           <a:p>
-            <a:fld id="{85A85A65-78AA-FE46-A2A3-634EFA88EC90}" type="slidenum">
+            <a:fld id="{FC0D9FB1-8EF9-A548-9CF2-3ABB4CF1D426}" type="slidenum">
               <a:rPr lang="en-US" smtClean="0"/>
               <a:t>‹#›</a:t>
             </a:fld>
@@ -1657,7 +1652,7 @@
     </p:spTree>
     <p:extLst>
       <p:ext uri="{BB962C8B-B14F-4D97-AF65-F5344CB8AC3E}">
-        <p14:creationId xmlns:p14="http://schemas.microsoft.com/office/powerpoint/2010/main" val="1214449185"/>
+        <p14:creationId xmlns:p14="http://schemas.microsoft.com/office/powerpoint/2010/main" val="2233483831"/>
       </p:ext>
     </p:extLst>
   </p:cSld>
@@ -1722,9 +1717,9 @@
           <a:bodyPr/>
           <a:lstStyle/>
           <a:p>
-            <a:fld id="{3D0C0BDB-E8FF-A14A-8C5A-11852E201FC6}" type="datetimeFigureOut">
+            <a:fld id="{FC91AAE3-157E-D849-B0EB-D94F4CACFBD1}" type="datetimeFigureOut">
               <a:rPr lang="en-US" smtClean="0"/>
-              <a:t>8/2/21</a:t>
+              <a:t>8/10/21</a:t>
             </a:fld>
             <a:endParaRPr lang="en-US"/>
           </a:p>
@@ -1764,7 +1759,7 @@
           <a:bodyPr/>
           <a:lstStyle/>
           <a:p>
-            <a:fld id="{85A85A65-78AA-FE46-A2A3-634EFA88EC90}" type="slidenum">
+            <a:fld id="{FC0D9FB1-8EF9-A548-9CF2-3ABB4CF1D426}" type="slidenum">
               <a:rPr lang="en-US" smtClean="0"/>
               <a:t>‹#›</a:t>
             </a:fld>
@@ -1775,7 +1770,7 @@
     </p:spTree>
     <p:extLst>
       <p:ext uri="{BB962C8B-B14F-4D97-AF65-F5344CB8AC3E}">
-        <p14:creationId xmlns:p14="http://schemas.microsoft.com/office/powerpoint/2010/main" val="2514280926"/>
+        <p14:creationId xmlns:p14="http://schemas.microsoft.com/office/powerpoint/2010/main" val="3405919086"/>
       </p:ext>
     </p:extLst>
   </p:cSld>
@@ -1817,9 +1812,9 @@
           <a:bodyPr/>
           <a:lstStyle/>
           <a:p>
-            <a:fld id="{3D0C0BDB-E8FF-A14A-8C5A-11852E201FC6}" type="datetimeFigureOut">
+            <a:fld id="{FC91AAE3-157E-D849-B0EB-D94F4CACFBD1}" type="datetimeFigureOut">
               <a:rPr lang="en-US" smtClean="0"/>
-              <a:t>8/2/21</a:t>
+              <a:t>8/10/21</a:t>
             </a:fld>
             <a:endParaRPr lang="en-US"/>
           </a:p>
@@ -1859,7 +1854,7 @@
           <a:bodyPr/>
           <a:lstStyle/>
           <a:p>
-            <a:fld id="{85A85A65-78AA-FE46-A2A3-634EFA88EC90}" type="slidenum">
+            <a:fld id="{FC0D9FB1-8EF9-A548-9CF2-3ABB4CF1D426}" type="slidenum">
               <a:rPr lang="en-US" smtClean="0"/>
               <a:t>‹#›</a:t>
             </a:fld>
@@ -1870,7 +1865,7 @@
     </p:spTree>
     <p:extLst>
       <p:ext uri="{BB962C8B-B14F-4D97-AF65-F5344CB8AC3E}">
-        <p14:creationId xmlns:p14="http://schemas.microsoft.com/office/powerpoint/2010/main" val="2542092818"/>
+        <p14:creationId xmlns:p14="http://schemas.microsoft.com/office/powerpoint/2010/main" val="1234824455"/>
       </p:ext>
     </p:extLst>
   </p:cSld>
@@ -1909,15 +1904,15 @@
         </p:nvSpPr>
         <p:spPr>
           <a:xfrm>
-            <a:off x="839788" y="563880"/>
-            <a:ext cx="3932237" cy="1973580"/>
+            <a:off x="456635" y="289560"/>
+            <a:ext cx="2138154" cy="1013460"/>
           </a:xfrm>
         </p:spPr>
         <p:txBody>
           <a:bodyPr anchor="b"/>
           <a:lstStyle>
             <a:lvl1pPr>
-              <a:defRPr sz="3947"/>
+              <a:defRPr sz="2027"/>
             </a:lvl1pPr>
           </a:lstStyle>
           <a:p>
@@ -1941,39 +1936,39 @@
         </p:nvSpPr>
         <p:spPr>
           <a:xfrm>
-            <a:off x="5183188" y="1217826"/>
-            <a:ext cx="6172200" cy="6010804"/>
+            <a:off x="2818358" y="625370"/>
+            <a:ext cx="3356134" cy="3086629"/>
           </a:xfrm>
         </p:spPr>
         <p:txBody>
           <a:bodyPr/>
           <a:lstStyle>
             <a:lvl1pPr>
-              <a:defRPr sz="3947"/>
+              <a:defRPr sz="2027"/>
             </a:lvl1pPr>
             <a:lvl2pPr>
-              <a:defRPr sz="3453"/>
+              <a:defRPr sz="1773"/>
             </a:lvl2pPr>
             <a:lvl3pPr>
-              <a:defRPr sz="2960"/>
+              <a:defRPr sz="1520"/>
             </a:lvl3pPr>
             <a:lvl4pPr>
-              <a:defRPr sz="2467"/>
+              <a:defRPr sz="1267"/>
             </a:lvl4pPr>
             <a:lvl5pPr>
-              <a:defRPr sz="2467"/>
+              <a:defRPr sz="1267"/>
             </a:lvl5pPr>
             <a:lvl6pPr>
-              <a:defRPr sz="2467"/>
+              <a:defRPr sz="1267"/>
             </a:lvl6pPr>
             <a:lvl7pPr>
-              <a:defRPr sz="2467"/>
+              <a:defRPr sz="1267"/>
             </a:lvl7pPr>
             <a:lvl8pPr>
-              <a:defRPr sz="2467"/>
+              <a:defRPr sz="1267"/>
             </a:lvl8pPr>
             <a:lvl9pPr>
-              <a:defRPr sz="2467"/>
+              <a:defRPr sz="1267"/>
             </a:lvl9pPr>
           </a:lstStyle>
           <a:p>
@@ -2026,8 +2021,8 @@
         </p:nvSpPr>
         <p:spPr>
           <a:xfrm>
-            <a:off x="839788" y="2537460"/>
-            <a:ext cx="3932237" cy="4700959"/>
+            <a:off x="456635" y="1303020"/>
+            <a:ext cx="2138154" cy="2414006"/>
           </a:xfrm>
         </p:spPr>
         <p:txBody>
@@ -2035,39 +2030,39 @@
           <a:lstStyle>
             <a:lvl1pPr marL="0" indent="0">
               <a:buNone/>
-              <a:defRPr sz="1973"/>
+              <a:defRPr sz="1013"/>
             </a:lvl1pPr>
-            <a:lvl2pPr marL="563865" indent="0">
-              <a:buNone/>
-              <a:defRPr sz="1727"/>
+            <a:lvl2pPr marL="289545" indent="0">
+              <a:buNone/>
+              <a:defRPr sz="887"/>
             </a:lvl2pPr>
-            <a:lvl3pPr marL="1127730" indent="0">
-              <a:buNone/>
-              <a:defRPr sz="1480"/>
+            <a:lvl3pPr marL="579090" indent="0">
+              <a:buNone/>
+              <a:defRPr sz="760"/>
             </a:lvl3pPr>
-            <a:lvl4pPr marL="1691594" indent="0">
-              <a:buNone/>
-              <a:defRPr sz="1233"/>
+            <a:lvl4pPr marL="868634" indent="0">
+              <a:buNone/>
+              <a:defRPr sz="633"/>
             </a:lvl4pPr>
-            <a:lvl5pPr marL="2255459" indent="0">
-              <a:buNone/>
-              <a:defRPr sz="1233"/>
+            <a:lvl5pPr marL="1158179" indent="0">
+              <a:buNone/>
+              <a:defRPr sz="633"/>
             </a:lvl5pPr>
-            <a:lvl6pPr marL="2819324" indent="0">
-              <a:buNone/>
-              <a:defRPr sz="1233"/>
+            <a:lvl6pPr marL="1447724" indent="0">
+              <a:buNone/>
+              <a:defRPr sz="633"/>
             </a:lvl6pPr>
-            <a:lvl7pPr marL="3383189" indent="0">
-              <a:buNone/>
-              <a:defRPr sz="1233"/>
+            <a:lvl7pPr marL="1737269" indent="0">
+              <a:buNone/>
+              <a:defRPr sz="633"/>
             </a:lvl7pPr>
-            <a:lvl8pPr marL="3947053" indent="0">
-              <a:buNone/>
-              <a:defRPr sz="1233"/>
+            <a:lvl8pPr marL="2026813" indent="0">
+              <a:buNone/>
+              <a:defRPr sz="633"/>
             </a:lvl8pPr>
-            <a:lvl9pPr marL="4510918" indent="0">
-              <a:buNone/>
-              <a:defRPr sz="1233"/>
+            <a:lvl9pPr marL="2316358" indent="0">
+              <a:buNone/>
+              <a:defRPr sz="633"/>
             </a:lvl9pPr>
           </a:lstStyle>
           <a:p>
@@ -2094,9 +2089,9 @@
           <a:bodyPr/>
           <a:lstStyle/>
           <a:p>
-            <a:fld id="{3D0C0BDB-E8FF-A14A-8C5A-11852E201FC6}" type="datetimeFigureOut">
+            <a:fld id="{FC91AAE3-157E-D849-B0EB-D94F4CACFBD1}" type="datetimeFigureOut">
               <a:rPr lang="en-US" smtClean="0"/>
-              <a:t>8/2/21</a:t>
+              <a:t>8/10/21</a:t>
             </a:fld>
             <a:endParaRPr lang="en-US"/>
           </a:p>
@@ -2136,7 +2131,7 @@
           <a:bodyPr/>
           <a:lstStyle/>
           <a:p>
-            <a:fld id="{85A85A65-78AA-FE46-A2A3-634EFA88EC90}" type="slidenum">
+            <a:fld id="{FC0D9FB1-8EF9-A548-9CF2-3ABB4CF1D426}" type="slidenum">
               <a:rPr lang="en-US" smtClean="0"/>
               <a:t>‹#›</a:t>
             </a:fld>
@@ -2147,7 +2142,7 @@
     </p:spTree>
     <p:extLst>
       <p:ext uri="{BB962C8B-B14F-4D97-AF65-F5344CB8AC3E}">
-        <p14:creationId xmlns:p14="http://schemas.microsoft.com/office/powerpoint/2010/main" val="501568823"/>
+        <p14:creationId xmlns:p14="http://schemas.microsoft.com/office/powerpoint/2010/main" val="2519493948"/>
       </p:ext>
     </p:extLst>
   </p:cSld>
@@ -2186,15 +2181,15 @@
         </p:nvSpPr>
         <p:spPr>
           <a:xfrm>
-            <a:off x="839788" y="563880"/>
-            <a:ext cx="3932237" cy="1973580"/>
+            <a:off x="456635" y="289560"/>
+            <a:ext cx="2138154" cy="1013460"/>
           </a:xfrm>
         </p:spPr>
         <p:txBody>
           <a:bodyPr anchor="b"/>
           <a:lstStyle>
             <a:lvl1pPr>
-              <a:defRPr sz="3947"/>
+              <a:defRPr sz="2027"/>
             </a:lvl1pPr>
           </a:lstStyle>
           <a:p>
@@ -2218,8 +2213,8 @@
         </p:nvSpPr>
         <p:spPr>
           <a:xfrm>
-            <a:off x="5183188" y="1217826"/>
-            <a:ext cx="6172200" cy="6010804"/>
+            <a:off x="2818358" y="625370"/>
+            <a:ext cx="3356134" cy="3086629"/>
           </a:xfrm>
         </p:spPr>
         <p:txBody>
@@ -2227,39 +2222,39 @@
           <a:lstStyle>
             <a:lvl1pPr marL="0" indent="0">
               <a:buNone/>
-              <a:defRPr sz="3947"/>
+              <a:defRPr sz="2027"/>
             </a:lvl1pPr>
-            <a:lvl2pPr marL="563865" indent="0">
-              <a:buNone/>
-              <a:defRPr sz="3453"/>
+            <a:lvl2pPr marL="289545" indent="0">
+              <a:buNone/>
+              <a:defRPr sz="1773"/>
             </a:lvl2pPr>
-            <a:lvl3pPr marL="1127730" indent="0">
-              <a:buNone/>
-              <a:defRPr sz="2960"/>
+            <a:lvl3pPr marL="579090" indent="0">
+              <a:buNone/>
+              <a:defRPr sz="1520"/>
             </a:lvl3pPr>
-            <a:lvl4pPr marL="1691594" indent="0">
-              <a:buNone/>
-              <a:defRPr sz="2467"/>
+            <a:lvl4pPr marL="868634" indent="0">
+              <a:buNone/>
+              <a:defRPr sz="1267"/>
             </a:lvl4pPr>
-            <a:lvl5pPr marL="2255459" indent="0">
-              <a:buNone/>
-              <a:defRPr sz="2467"/>
+            <a:lvl5pPr marL="1158179" indent="0">
+              <a:buNone/>
+              <a:defRPr sz="1267"/>
             </a:lvl5pPr>
-            <a:lvl6pPr marL="2819324" indent="0">
-              <a:buNone/>
-              <a:defRPr sz="2467"/>
+            <a:lvl6pPr marL="1447724" indent="0">
+              <a:buNone/>
+              <a:defRPr sz="1267"/>
             </a:lvl6pPr>
-            <a:lvl7pPr marL="3383189" indent="0">
-              <a:buNone/>
-              <a:defRPr sz="2467"/>
+            <a:lvl7pPr marL="1737269" indent="0">
+              <a:buNone/>
+              <a:defRPr sz="1267"/>
             </a:lvl7pPr>
-            <a:lvl8pPr marL="3947053" indent="0">
-              <a:buNone/>
-              <a:defRPr sz="2467"/>
+            <a:lvl8pPr marL="2026813" indent="0">
+              <a:buNone/>
+              <a:defRPr sz="1267"/>
             </a:lvl8pPr>
-            <a:lvl9pPr marL="4510918" indent="0">
-              <a:buNone/>
-              <a:defRPr sz="2467"/>
+            <a:lvl9pPr marL="2316358" indent="0">
+              <a:buNone/>
+              <a:defRPr sz="1267"/>
             </a:lvl9pPr>
           </a:lstStyle>
           <a:p>
@@ -2283,8 +2278,8 @@
         </p:nvSpPr>
         <p:spPr>
           <a:xfrm>
-            <a:off x="839788" y="2537460"/>
-            <a:ext cx="3932237" cy="4700959"/>
+            <a:off x="456635" y="1303020"/>
+            <a:ext cx="2138154" cy="2414006"/>
           </a:xfrm>
         </p:spPr>
         <p:txBody>
@@ -2292,39 +2287,39 @@
           <a:lstStyle>
             <a:lvl1pPr marL="0" indent="0">
               <a:buNone/>
-              <a:defRPr sz="1973"/>
+              <a:defRPr sz="1013"/>
             </a:lvl1pPr>
-            <a:lvl2pPr marL="563865" indent="0">
-              <a:buNone/>
-              <a:defRPr sz="1727"/>
+            <a:lvl2pPr marL="289545" indent="0">
+              <a:buNone/>
+              <a:defRPr sz="887"/>
             </a:lvl2pPr>
-            <a:lvl3pPr marL="1127730" indent="0">
-              <a:buNone/>
-              <a:defRPr sz="1480"/>
+            <a:lvl3pPr marL="579090" indent="0">
+              <a:buNone/>
+              <a:defRPr sz="760"/>
             </a:lvl3pPr>
-            <a:lvl4pPr marL="1691594" indent="0">
-              <a:buNone/>
-              <a:defRPr sz="1233"/>
+            <a:lvl4pPr marL="868634" indent="0">
+              <a:buNone/>
+              <a:defRPr sz="633"/>
             </a:lvl4pPr>
-            <a:lvl5pPr marL="2255459" indent="0">
-              <a:buNone/>
-              <a:defRPr sz="1233"/>
+            <a:lvl5pPr marL="1158179" indent="0">
+              <a:buNone/>
+              <a:defRPr sz="633"/>
             </a:lvl5pPr>
-            <a:lvl6pPr marL="2819324" indent="0">
-              <a:buNone/>
-              <a:defRPr sz="1233"/>
+            <a:lvl6pPr marL="1447724" indent="0">
+              <a:buNone/>
+              <a:defRPr sz="633"/>
             </a:lvl6pPr>
-            <a:lvl7pPr marL="3383189" indent="0">
-              <a:buNone/>
-              <a:defRPr sz="1233"/>
+            <a:lvl7pPr marL="1737269" indent="0">
+              <a:buNone/>
+              <a:defRPr sz="633"/>
             </a:lvl7pPr>
-            <a:lvl8pPr marL="3947053" indent="0">
-              <a:buNone/>
-              <a:defRPr sz="1233"/>
+            <a:lvl8pPr marL="2026813" indent="0">
+              <a:buNone/>
+              <a:defRPr sz="633"/>
             </a:lvl8pPr>
-            <a:lvl9pPr marL="4510918" indent="0">
-              <a:buNone/>
-              <a:defRPr sz="1233"/>
+            <a:lvl9pPr marL="2316358" indent="0">
+              <a:buNone/>
+              <a:defRPr sz="633"/>
             </a:lvl9pPr>
           </a:lstStyle>
           <a:p>
@@ -2351,9 +2346,9 @@
           <a:bodyPr/>
           <a:lstStyle/>
           <a:p>
-            <a:fld id="{3D0C0BDB-E8FF-A14A-8C5A-11852E201FC6}" type="datetimeFigureOut">
+            <a:fld id="{FC91AAE3-157E-D849-B0EB-D94F4CACFBD1}" type="datetimeFigureOut">
               <a:rPr lang="en-US" smtClean="0"/>
-              <a:t>8/2/21</a:t>
+              <a:t>8/10/21</a:t>
             </a:fld>
             <a:endParaRPr lang="en-US"/>
           </a:p>
@@ -2393,7 +2388,7 @@
           <a:bodyPr/>
           <a:lstStyle/>
           <a:p>
-            <a:fld id="{85A85A65-78AA-FE46-A2A3-634EFA88EC90}" type="slidenum">
+            <a:fld id="{FC0D9FB1-8EF9-A548-9CF2-3ABB4CF1D426}" type="slidenum">
               <a:rPr lang="en-US" smtClean="0"/>
               <a:t>‹#›</a:t>
             </a:fld>
@@ -2404,7 +2399,7 @@
     </p:spTree>
     <p:extLst>
       <p:ext uri="{BB962C8B-B14F-4D97-AF65-F5344CB8AC3E}">
-        <p14:creationId xmlns:p14="http://schemas.microsoft.com/office/powerpoint/2010/main" val="653593961"/>
+        <p14:creationId xmlns:p14="http://schemas.microsoft.com/office/powerpoint/2010/main" val="1370727576"/>
       </p:ext>
     </p:extLst>
   </p:cSld>
@@ -2448,8 +2443,8 @@
         </p:nvSpPr>
         <p:spPr>
           <a:xfrm>
-            <a:off x="838200" y="450323"/>
-            <a:ext cx="10515600" cy="1634861"/>
+            <a:off x="455771" y="231247"/>
+            <a:ext cx="5717858" cy="839523"/>
           </a:xfrm>
           <a:prstGeom prst="rect">
             <a:avLst/>
@@ -2481,8 +2476,8 @@
         </p:nvSpPr>
         <p:spPr>
           <a:xfrm>
-            <a:off x="838200" y="2251604"/>
-            <a:ext cx="10515600" cy="5366650"/>
+            <a:off x="455771" y="1156229"/>
+            <a:ext cx="5717858" cy="2755847"/>
           </a:xfrm>
           <a:prstGeom prst="rect">
             <a:avLst/>
@@ -2543,8 +2538,8 @@
         </p:nvSpPr>
         <p:spPr>
           <a:xfrm>
-            <a:off x="838200" y="7839500"/>
-            <a:ext cx="2743200" cy="450321"/>
+            <a:off x="455771" y="4025689"/>
+            <a:ext cx="1491615" cy="231246"/>
           </a:xfrm>
           <a:prstGeom prst="rect">
             <a:avLst/>
@@ -2554,7 +2549,7 @@
           <a:bodyPr vert="horz" lIns="91440" tIns="45720" rIns="91440" bIns="45720" rtlCol="0" anchor="ctr"/>
           <a:lstStyle>
             <a:lvl1pPr algn="l">
-              <a:defRPr sz="1480">
+              <a:defRPr sz="760">
                 <a:solidFill>
                   <a:schemeClr val="tx1">
                     <a:tint val="75000"/>
@@ -2564,9 +2559,9 @@
             </a:lvl1pPr>
           </a:lstStyle>
           <a:p>
-            <a:fld id="{3D0C0BDB-E8FF-A14A-8C5A-11852E201FC6}" type="datetimeFigureOut">
+            <a:fld id="{FC91AAE3-157E-D849-B0EB-D94F4CACFBD1}" type="datetimeFigureOut">
               <a:rPr lang="en-US" smtClean="0"/>
-              <a:t>8/2/21</a:t>
+              <a:t>8/10/21</a:t>
             </a:fld>
             <a:endParaRPr lang="en-US"/>
           </a:p>
@@ -2584,8 +2579,8 @@
         </p:nvSpPr>
         <p:spPr>
           <a:xfrm>
-            <a:off x="4038600" y="7839500"/>
-            <a:ext cx="4114800" cy="450321"/>
+            <a:off x="2195989" y="4025689"/>
+            <a:ext cx="2237423" cy="231246"/>
           </a:xfrm>
           <a:prstGeom prst="rect">
             <a:avLst/>
@@ -2595,7 +2590,7 @@
           <a:bodyPr vert="horz" lIns="91440" tIns="45720" rIns="91440" bIns="45720" rtlCol="0" anchor="ctr"/>
           <a:lstStyle>
             <a:lvl1pPr algn="ctr">
-              <a:defRPr sz="1480">
+              <a:defRPr sz="760">
                 <a:solidFill>
                   <a:schemeClr val="tx1">
                     <a:tint val="75000"/>
@@ -2621,8 +2616,8 @@
         </p:nvSpPr>
         <p:spPr>
           <a:xfrm>
-            <a:off x="8610600" y="7839500"/>
-            <a:ext cx="2743200" cy="450321"/>
+            <a:off x="4682014" y="4025689"/>
+            <a:ext cx="1491615" cy="231246"/>
           </a:xfrm>
           <a:prstGeom prst="rect">
             <a:avLst/>
@@ -2632,7 +2627,7 @@
           <a:bodyPr vert="horz" lIns="91440" tIns="45720" rIns="91440" bIns="45720" rtlCol="0" anchor="ctr"/>
           <a:lstStyle>
             <a:lvl1pPr algn="r">
-              <a:defRPr sz="1480">
+              <a:defRPr sz="760">
                 <a:solidFill>
                   <a:schemeClr val="tx1">
                     <a:tint val="75000"/>
@@ -2642,7 +2637,7 @@
             </a:lvl1pPr>
           </a:lstStyle>
           <a:p>
-            <a:fld id="{85A85A65-78AA-FE46-A2A3-634EFA88EC90}" type="slidenum">
+            <a:fld id="{FC0D9FB1-8EF9-A548-9CF2-3ABB4CF1D426}" type="slidenum">
               <a:rPr lang="en-US" smtClean="0"/>
               <a:t>‹#›</a:t>
             </a:fld>
@@ -2653,27 +2648,27 @@
     </p:spTree>
     <p:extLst>
       <p:ext uri="{BB962C8B-B14F-4D97-AF65-F5344CB8AC3E}">
-        <p14:creationId xmlns:p14="http://schemas.microsoft.com/office/powerpoint/2010/main" val="3574563731"/>
+        <p14:creationId xmlns:p14="http://schemas.microsoft.com/office/powerpoint/2010/main" val="3028811176"/>
       </p:ext>
     </p:extLst>
   </p:cSld>
   <p:clrMap bg1="lt1" tx1="dk1" bg2="lt2" tx2="dk2" accent1="accent1" accent2="accent2" accent3="accent3" accent4="accent4" accent5="accent5" accent6="accent6" hlink="hlink" folHlink="folHlink"/>
   <p:sldLayoutIdLst>
-    <p:sldLayoutId id="2147483673" r:id="rId1"/>
-    <p:sldLayoutId id="2147483674" r:id="rId2"/>
-    <p:sldLayoutId id="2147483675" r:id="rId3"/>
-    <p:sldLayoutId id="2147483676" r:id="rId4"/>
-    <p:sldLayoutId id="2147483677" r:id="rId5"/>
-    <p:sldLayoutId id="2147483678" r:id="rId6"/>
-    <p:sldLayoutId id="2147483679" r:id="rId7"/>
-    <p:sldLayoutId id="2147483680" r:id="rId8"/>
-    <p:sldLayoutId id="2147483681" r:id="rId9"/>
-    <p:sldLayoutId id="2147483682" r:id="rId10"/>
-    <p:sldLayoutId id="2147483683" r:id="rId11"/>
+    <p:sldLayoutId id="2147483721" r:id="rId1"/>
+    <p:sldLayoutId id="2147483722" r:id="rId2"/>
+    <p:sldLayoutId id="2147483723" r:id="rId3"/>
+    <p:sldLayoutId id="2147483724" r:id="rId4"/>
+    <p:sldLayoutId id="2147483725" r:id="rId5"/>
+    <p:sldLayoutId id="2147483726" r:id="rId6"/>
+    <p:sldLayoutId id="2147483727" r:id="rId7"/>
+    <p:sldLayoutId id="2147483728" r:id="rId8"/>
+    <p:sldLayoutId id="2147483729" r:id="rId9"/>
+    <p:sldLayoutId id="2147483730" r:id="rId10"/>
+    <p:sldLayoutId id="2147483731" r:id="rId11"/>
   </p:sldLayoutIdLst>
   <p:txStyles>
     <p:titleStyle>
-      <a:lvl1pPr algn="l" defTabSz="1127730" rtl="0" eaLnBrk="1" latinLnBrk="0" hangingPunct="1">
+      <a:lvl1pPr algn="l" defTabSz="579090" rtl="0" eaLnBrk="1" latinLnBrk="0" hangingPunct="1">
         <a:lnSpc>
           <a:spcPct val="90000"/>
         </a:lnSpc>
@@ -2681,7 +2676,7 @@
           <a:spcPct val="0"/>
         </a:spcBef>
         <a:buNone/>
-        <a:defRPr sz="5427" kern="1200">
+        <a:defRPr sz="2787" kern="1200">
           <a:solidFill>
             <a:schemeClr val="tx1"/>
           </a:solidFill>
@@ -2692,16 +2687,16 @@
       </a:lvl1pPr>
     </p:titleStyle>
     <p:bodyStyle>
-      <a:lvl1pPr marL="281932" indent="-281932" algn="l" defTabSz="1127730" rtl="0" eaLnBrk="1" latinLnBrk="0" hangingPunct="1">
+      <a:lvl1pPr marL="144772" indent="-144772" algn="l" defTabSz="579090" rtl="0" eaLnBrk="1" latinLnBrk="0" hangingPunct="1">
         <a:lnSpc>
           <a:spcPct val="90000"/>
         </a:lnSpc>
         <a:spcBef>
-          <a:spcPts val="1233"/>
+          <a:spcPts val="633"/>
         </a:spcBef>
         <a:buFont typeface="Arial" panose="020B0604020202020204" pitchFamily="34" charset="0"/>
         <a:buChar char="•"/>
-        <a:defRPr sz="3453" kern="1200">
+        <a:defRPr sz="1773" kern="1200">
           <a:solidFill>
             <a:schemeClr val="tx1"/>
           </a:solidFill>
@@ -2710,16 +2705,16 @@
           <a:cs typeface="+mn-cs"/>
         </a:defRPr>
       </a:lvl1pPr>
-      <a:lvl2pPr marL="845797" indent="-281932" algn="l" defTabSz="1127730" rtl="0" eaLnBrk="1" latinLnBrk="0" hangingPunct="1">
+      <a:lvl2pPr marL="434317" indent="-144772" algn="l" defTabSz="579090" rtl="0" eaLnBrk="1" latinLnBrk="0" hangingPunct="1">
         <a:lnSpc>
           <a:spcPct val="90000"/>
         </a:lnSpc>
         <a:spcBef>
-          <a:spcPts val="617"/>
+          <a:spcPts val="317"/>
         </a:spcBef>
         <a:buFont typeface="Arial" panose="020B0604020202020204" pitchFamily="34" charset="0"/>
         <a:buChar char="•"/>
-        <a:defRPr sz="2960" kern="1200">
+        <a:defRPr sz="1520" kern="1200">
           <a:solidFill>
             <a:schemeClr val="tx1"/>
           </a:solidFill>
@@ -2728,16 +2723,16 @@
           <a:cs typeface="+mn-cs"/>
         </a:defRPr>
       </a:lvl2pPr>
-      <a:lvl3pPr marL="1409662" indent="-281932" algn="l" defTabSz="1127730" rtl="0" eaLnBrk="1" latinLnBrk="0" hangingPunct="1">
+      <a:lvl3pPr marL="723862" indent="-144772" algn="l" defTabSz="579090" rtl="0" eaLnBrk="1" latinLnBrk="0" hangingPunct="1">
         <a:lnSpc>
           <a:spcPct val="90000"/>
         </a:lnSpc>
         <a:spcBef>
-          <a:spcPts val="617"/>
+          <a:spcPts val="317"/>
         </a:spcBef>
         <a:buFont typeface="Arial" panose="020B0604020202020204" pitchFamily="34" charset="0"/>
         <a:buChar char="•"/>
-        <a:defRPr sz="2467" kern="1200">
+        <a:defRPr sz="1267" kern="1200">
           <a:solidFill>
             <a:schemeClr val="tx1"/>
           </a:solidFill>
@@ -2746,16 +2741,16 @@
           <a:cs typeface="+mn-cs"/>
         </a:defRPr>
       </a:lvl3pPr>
-      <a:lvl4pPr marL="1973527" indent="-281932" algn="l" defTabSz="1127730" rtl="0" eaLnBrk="1" latinLnBrk="0" hangingPunct="1">
+      <a:lvl4pPr marL="1013407" indent="-144772" algn="l" defTabSz="579090" rtl="0" eaLnBrk="1" latinLnBrk="0" hangingPunct="1">
         <a:lnSpc>
           <a:spcPct val="90000"/>
         </a:lnSpc>
         <a:spcBef>
-          <a:spcPts val="617"/>
+          <a:spcPts val="317"/>
         </a:spcBef>
         <a:buFont typeface="Arial" panose="020B0604020202020204" pitchFamily="34" charset="0"/>
         <a:buChar char="•"/>
-        <a:defRPr sz="2220" kern="1200">
+        <a:defRPr sz="1140" kern="1200">
           <a:solidFill>
             <a:schemeClr val="tx1"/>
           </a:solidFill>
@@ -2764,16 +2759,16 @@
           <a:cs typeface="+mn-cs"/>
         </a:defRPr>
       </a:lvl4pPr>
-      <a:lvl5pPr marL="2537391" indent="-281932" algn="l" defTabSz="1127730" rtl="0" eaLnBrk="1" latinLnBrk="0" hangingPunct="1">
+      <a:lvl5pPr marL="1302951" indent="-144772" algn="l" defTabSz="579090" rtl="0" eaLnBrk="1" latinLnBrk="0" hangingPunct="1">
         <a:lnSpc>
           <a:spcPct val="90000"/>
         </a:lnSpc>
         <a:spcBef>
-          <a:spcPts val="617"/>
+          <a:spcPts val="317"/>
         </a:spcBef>
         <a:buFont typeface="Arial" panose="020B0604020202020204" pitchFamily="34" charset="0"/>
         <a:buChar char="•"/>
-        <a:defRPr sz="2220" kern="1200">
+        <a:defRPr sz="1140" kern="1200">
           <a:solidFill>
             <a:schemeClr val="tx1"/>
           </a:solidFill>
@@ -2782,16 +2777,16 @@
           <a:cs typeface="+mn-cs"/>
         </a:defRPr>
       </a:lvl5pPr>
-      <a:lvl6pPr marL="3101256" indent="-281932" algn="l" defTabSz="1127730" rtl="0" eaLnBrk="1" latinLnBrk="0" hangingPunct="1">
+      <a:lvl6pPr marL="1592496" indent="-144772" algn="l" defTabSz="579090" rtl="0" eaLnBrk="1" latinLnBrk="0" hangingPunct="1">
         <a:lnSpc>
           <a:spcPct val="90000"/>
         </a:lnSpc>
         <a:spcBef>
-          <a:spcPts val="617"/>
+          <a:spcPts val="317"/>
         </a:spcBef>
         <a:buFont typeface="Arial" panose="020B0604020202020204" pitchFamily="34" charset="0"/>
         <a:buChar char="•"/>
-        <a:defRPr sz="2220" kern="1200">
+        <a:defRPr sz="1140" kern="1200">
           <a:solidFill>
             <a:schemeClr val="tx1"/>
           </a:solidFill>
@@ -2800,16 +2795,16 @@
           <a:cs typeface="+mn-cs"/>
         </a:defRPr>
       </a:lvl6pPr>
-      <a:lvl7pPr marL="3665121" indent="-281932" algn="l" defTabSz="1127730" rtl="0" eaLnBrk="1" latinLnBrk="0" hangingPunct="1">
+      <a:lvl7pPr marL="1882041" indent="-144772" algn="l" defTabSz="579090" rtl="0" eaLnBrk="1" latinLnBrk="0" hangingPunct="1">
         <a:lnSpc>
           <a:spcPct val="90000"/>
         </a:lnSpc>
         <a:spcBef>
-          <a:spcPts val="617"/>
+          <a:spcPts val="317"/>
         </a:spcBef>
         <a:buFont typeface="Arial" panose="020B0604020202020204" pitchFamily="34" charset="0"/>
         <a:buChar char="•"/>
-        <a:defRPr sz="2220" kern="1200">
+        <a:defRPr sz="1140" kern="1200">
           <a:solidFill>
             <a:schemeClr val="tx1"/>
           </a:solidFill>
@@ -2818,16 +2813,16 @@
           <a:cs typeface="+mn-cs"/>
         </a:defRPr>
       </a:lvl7pPr>
-      <a:lvl8pPr marL="4228986" indent="-281932" algn="l" defTabSz="1127730" rtl="0" eaLnBrk="1" latinLnBrk="0" hangingPunct="1">
+      <a:lvl8pPr marL="2171586" indent="-144772" algn="l" defTabSz="579090" rtl="0" eaLnBrk="1" latinLnBrk="0" hangingPunct="1">
         <a:lnSpc>
           <a:spcPct val="90000"/>
         </a:lnSpc>
         <a:spcBef>
-          <a:spcPts val="617"/>
+          <a:spcPts val="317"/>
         </a:spcBef>
         <a:buFont typeface="Arial" panose="020B0604020202020204" pitchFamily="34" charset="0"/>
         <a:buChar char="•"/>
-        <a:defRPr sz="2220" kern="1200">
+        <a:defRPr sz="1140" kern="1200">
           <a:solidFill>
             <a:schemeClr val="tx1"/>
           </a:solidFill>
@@ -2836,16 +2831,16 @@
           <a:cs typeface="+mn-cs"/>
         </a:defRPr>
       </a:lvl8pPr>
-      <a:lvl9pPr marL="4792850" indent="-281932" algn="l" defTabSz="1127730" rtl="0" eaLnBrk="1" latinLnBrk="0" hangingPunct="1">
+      <a:lvl9pPr marL="2461130" indent="-144772" algn="l" defTabSz="579090" rtl="0" eaLnBrk="1" latinLnBrk="0" hangingPunct="1">
         <a:lnSpc>
           <a:spcPct val="90000"/>
         </a:lnSpc>
         <a:spcBef>
-          <a:spcPts val="617"/>
+          <a:spcPts val="317"/>
         </a:spcBef>
         <a:buFont typeface="Arial" panose="020B0604020202020204" pitchFamily="34" charset="0"/>
         <a:buChar char="•"/>
-        <a:defRPr sz="2220" kern="1200">
+        <a:defRPr sz="1140" kern="1200">
           <a:solidFill>
             <a:schemeClr val="tx1"/>
           </a:solidFill>
@@ -2859,8 +2854,8 @@
       <a:defPPr>
         <a:defRPr lang="en-US"/>
       </a:defPPr>
-      <a:lvl1pPr marL="0" algn="l" defTabSz="1127730" rtl="0" eaLnBrk="1" latinLnBrk="0" hangingPunct="1">
-        <a:defRPr sz="2220" kern="1200">
+      <a:lvl1pPr marL="0" algn="l" defTabSz="579090" rtl="0" eaLnBrk="1" latinLnBrk="0" hangingPunct="1">
+        <a:defRPr sz="1140" kern="1200">
           <a:solidFill>
             <a:schemeClr val="tx1"/>
           </a:solidFill>
@@ -2869,8 +2864,8 @@
           <a:cs typeface="+mn-cs"/>
         </a:defRPr>
       </a:lvl1pPr>
-      <a:lvl2pPr marL="563865" algn="l" defTabSz="1127730" rtl="0" eaLnBrk="1" latinLnBrk="0" hangingPunct="1">
-        <a:defRPr sz="2220" kern="1200">
+      <a:lvl2pPr marL="289545" algn="l" defTabSz="579090" rtl="0" eaLnBrk="1" latinLnBrk="0" hangingPunct="1">
+        <a:defRPr sz="1140" kern="1200">
           <a:solidFill>
             <a:schemeClr val="tx1"/>
           </a:solidFill>
@@ -2879,8 +2874,8 @@
           <a:cs typeface="+mn-cs"/>
         </a:defRPr>
       </a:lvl2pPr>
-      <a:lvl3pPr marL="1127730" algn="l" defTabSz="1127730" rtl="0" eaLnBrk="1" latinLnBrk="0" hangingPunct="1">
-        <a:defRPr sz="2220" kern="1200">
+      <a:lvl3pPr marL="579090" algn="l" defTabSz="579090" rtl="0" eaLnBrk="1" latinLnBrk="0" hangingPunct="1">
+        <a:defRPr sz="1140" kern="1200">
           <a:solidFill>
             <a:schemeClr val="tx1"/>
           </a:solidFill>
@@ -2889,8 +2884,8 @@
           <a:cs typeface="+mn-cs"/>
         </a:defRPr>
       </a:lvl3pPr>
-      <a:lvl4pPr marL="1691594" algn="l" defTabSz="1127730" rtl="0" eaLnBrk="1" latinLnBrk="0" hangingPunct="1">
-        <a:defRPr sz="2220" kern="1200">
+      <a:lvl4pPr marL="868634" algn="l" defTabSz="579090" rtl="0" eaLnBrk="1" latinLnBrk="0" hangingPunct="1">
+        <a:defRPr sz="1140" kern="1200">
           <a:solidFill>
             <a:schemeClr val="tx1"/>
           </a:solidFill>
@@ -2899,8 +2894,8 @@
           <a:cs typeface="+mn-cs"/>
         </a:defRPr>
       </a:lvl4pPr>
-      <a:lvl5pPr marL="2255459" algn="l" defTabSz="1127730" rtl="0" eaLnBrk="1" latinLnBrk="0" hangingPunct="1">
-        <a:defRPr sz="2220" kern="1200">
+      <a:lvl5pPr marL="1158179" algn="l" defTabSz="579090" rtl="0" eaLnBrk="1" latinLnBrk="0" hangingPunct="1">
+        <a:defRPr sz="1140" kern="1200">
           <a:solidFill>
             <a:schemeClr val="tx1"/>
           </a:solidFill>
@@ -2909,8 +2904,8 @@
           <a:cs typeface="+mn-cs"/>
         </a:defRPr>
       </a:lvl5pPr>
-      <a:lvl6pPr marL="2819324" algn="l" defTabSz="1127730" rtl="0" eaLnBrk="1" latinLnBrk="0" hangingPunct="1">
-        <a:defRPr sz="2220" kern="1200">
+      <a:lvl6pPr marL="1447724" algn="l" defTabSz="579090" rtl="0" eaLnBrk="1" latinLnBrk="0" hangingPunct="1">
+        <a:defRPr sz="1140" kern="1200">
           <a:solidFill>
             <a:schemeClr val="tx1"/>
           </a:solidFill>
@@ -2919,8 +2914,8 @@
           <a:cs typeface="+mn-cs"/>
         </a:defRPr>
       </a:lvl6pPr>
-      <a:lvl7pPr marL="3383189" algn="l" defTabSz="1127730" rtl="0" eaLnBrk="1" latinLnBrk="0" hangingPunct="1">
-        <a:defRPr sz="2220" kern="1200">
+      <a:lvl7pPr marL="1737269" algn="l" defTabSz="579090" rtl="0" eaLnBrk="1" latinLnBrk="0" hangingPunct="1">
+        <a:defRPr sz="1140" kern="1200">
           <a:solidFill>
             <a:schemeClr val="tx1"/>
           </a:solidFill>
@@ -2929,8 +2924,8 @@
           <a:cs typeface="+mn-cs"/>
         </a:defRPr>
       </a:lvl7pPr>
-      <a:lvl8pPr marL="3947053" algn="l" defTabSz="1127730" rtl="0" eaLnBrk="1" latinLnBrk="0" hangingPunct="1">
-        <a:defRPr sz="2220" kern="1200">
+      <a:lvl8pPr marL="2026813" algn="l" defTabSz="579090" rtl="0" eaLnBrk="1" latinLnBrk="0" hangingPunct="1">
+        <a:defRPr sz="1140" kern="1200">
           <a:solidFill>
             <a:schemeClr val="tx1"/>
           </a:solidFill>
@@ -2939,8 +2934,8 @@
           <a:cs typeface="+mn-cs"/>
         </a:defRPr>
       </a:lvl8pPr>
-      <a:lvl9pPr marL="4510918" algn="l" defTabSz="1127730" rtl="0" eaLnBrk="1" latinLnBrk="0" hangingPunct="1">
-        <a:defRPr sz="2220" kern="1200">
+      <a:lvl9pPr marL="2316358" algn="l" defTabSz="579090" rtl="0" eaLnBrk="1" latinLnBrk="0" hangingPunct="1">
+        <a:defRPr sz="1140" kern="1200">
           <a:solidFill>
             <a:schemeClr val="tx1"/>
           </a:solidFill>
@@ -2971,1304 +2966,12 @@
           <a:chExt cx="0" cy="0"/>
         </a:xfrm>
       </p:grpSpPr>
-      <p:grpSp>
-        <p:nvGrpSpPr>
-          <p:cNvPr id="67" name="Group 66">
+      <p:pic>
+        <p:nvPicPr>
+          <p:cNvPr id="5" name="Picture 4">
             <a:extLst>
               <a:ext uri="{FF2B5EF4-FFF2-40B4-BE49-F238E27FC236}">
-                <a16:creationId xmlns:a16="http://schemas.microsoft.com/office/drawing/2014/main" id="{F96EC710-16CC-224B-932F-D0C899EBCF23}"/>
-              </a:ext>
-            </a:extLst>
-          </p:cNvPr>
-          <p:cNvGrpSpPr/>
-          <p:nvPr/>
-        </p:nvGrpSpPr>
-        <p:grpSpPr>
-          <a:xfrm>
-            <a:off x="0" y="27940"/>
-            <a:ext cx="12192000" cy="2349324"/>
-            <a:chOff x="0" y="0"/>
-            <a:chExt cx="12192000" cy="2349324"/>
-          </a:xfrm>
-        </p:grpSpPr>
-        <p:pic>
-          <p:nvPicPr>
-            <p:cNvPr id="5" name="Picture 4">
-              <a:extLst>
-                <a:ext uri="{FF2B5EF4-FFF2-40B4-BE49-F238E27FC236}">
-                  <a16:creationId xmlns:a16="http://schemas.microsoft.com/office/drawing/2014/main" id="{8E426704-E2B1-BF47-8882-421A249190E3}"/>
-                </a:ext>
-              </a:extLst>
-            </p:cNvPr>
-            <p:cNvPicPr>
-              <a:picLocks noChangeAspect="1"/>
-            </p:cNvPicPr>
-            <p:nvPr/>
-          </p:nvPicPr>
-          <p:blipFill>
-            <a:blip r:embed="rId2"/>
-            <a:stretch>
-              <a:fillRect/>
-            </a:stretch>
-          </p:blipFill>
-          <p:spPr>
-            <a:xfrm>
-              <a:off x="0" y="0"/>
-              <a:ext cx="12192000" cy="1664402"/>
-            </a:xfrm>
-            <a:prstGeom prst="rect">
-              <a:avLst/>
-            </a:prstGeom>
-          </p:spPr>
-        </p:pic>
-        <p:sp>
-          <p:nvSpPr>
-            <p:cNvPr id="14" name="TextBox 13">
-              <a:extLst>
-                <a:ext uri="{FF2B5EF4-FFF2-40B4-BE49-F238E27FC236}">
-                  <a16:creationId xmlns:a16="http://schemas.microsoft.com/office/drawing/2014/main" id="{1997CF3A-C50E-C94F-957E-B5CF623F72EB}"/>
-                </a:ext>
-              </a:extLst>
-            </p:cNvPr>
-            <p:cNvSpPr txBox="1"/>
-            <p:nvPr/>
-          </p:nvSpPr>
-          <p:spPr>
-            <a:xfrm>
-              <a:off x="21118" y="1778400"/>
-              <a:ext cx="788999" cy="246221"/>
-            </a:xfrm>
-            <a:prstGeom prst="rect">
-              <a:avLst/>
-            </a:prstGeom>
-            <a:noFill/>
-          </p:spPr>
-          <p:txBody>
-            <a:bodyPr wrap="none" rtlCol="0">
-              <a:spAutoFit/>
-            </a:bodyPr>
-            <a:lstStyle/>
-            <a:p>
-              <a:r>
-                <a:rPr lang="en-US" sz="1000" dirty="0">
-                  <a:latin typeface="Arial" panose="020B0604020202020204" pitchFamily="34" charset="0"/>
-                  <a:cs typeface="Arial" panose="020B0604020202020204" pitchFamily="34" charset="0"/>
-                </a:rPr>
-                <a:t>wait times:</a:t>
-              </a:r>
-            </a:p>
-          </p:txBody>
-        </p:sp>
-        <p:grpSp>
-          <p:nvGrpSpPr>
-            <p:cNvPr id="56" name="Group 55">
-              <a:extLst>
-                <a:ext uri="{FF2B5EF4-FFF2-40B4-BE49-F238E27FC236}">
-                  <a16:creationId xmlns:a16="http://schemas.microsoft.com/office/drawing/2014/main" id="{6F47F001-92DE-1949-A7F1-B37116902C50}"/>
-                </a:ext>
-              </a:extLst>
-            </p:cNvPr>
-            <p:cNvGrpSpPr/>
-            <p:nvPr/>
-          </p:nvGrpSpPr>
-          <p:grpSpPr>
-            <a:xfrm>
-              <a:off x="4711901" y="1326669"/>
-              <a:ext cx="2963395" cy="1022655"/>
-              <a:chOff x="4711901" y="1326669"/>
-              <a:chExt cx="2963395" cy="1022655"/>
-            </a:xfrm>
-          </p:grpSpPr>
-          <p:cxnSp>
-            <p:nvCxnSpPr>
-              <p:cNvPr id="16" name="Straight Connector 15">
-                <a:extLst>
-                  <a:ext uri="{FF2B5EF4-FFF2-40B4-BE49-F238E27FC236}">
-                    <a16:creationId xmlns:a16="http://schemas.microsoft.com/office/drawing/2014/main" id="{D7C963B8-7B56-B04C-9EEA-700835244197}"/>
-                  </a:ext>
-                </a:extLst>
-              </p:cNvPr>
-              <p:cNvCxnSpPr>
-                <a:cxnSpLocks/>
-              </p:cNvCxnSpPr>
-              <p:nvPr/>
-            </p:nvCxnSpPr>
-            <p:spPr>
-              <a:xfrm>
-                <a:off x="7675296" y="1326669"/>
-                <a:ext cx="0" cy="565239"/>
-              </a:xfrm>
-              <a:prstGeom prst="line">
-                <a:avLst/>
-              </a:prstGeom>
-              <a:ln w="9525" cap="flat" cmpd="sng" algn="ctr">
-                <a:solidFill>
-                  <a:schemeClr val="accent3"/>
-                </a:solidFill>
-                <a:prstDash val="dash"/>
-                <a:round/>
-                <a:headEnd type="none" w="med" len="med"/>
-                <a:tailEnd type="none" w="med" len="med"/>
-              </a:ln>
-            </p:spPr>
-            <p:style>
-              <a:lnRef idx="0">
-                <a:scrgbClr r="0" g="0" b="0"/>
-              </a:lnRef>
-              <a:fillRef idx="0">
-                <a:scrgbClr r="0" g="0" b="0"/>
-              </a:fillRef>
-              <a:effectRef idx="0">
-                <a:scrgbClr r="0" g="0" b="0"/>
-              </a:effectRef>
-              <a:fontRef idx="minor">
-                <a:schemeClr val="tx1"/>
-              </a:fontRef>
-            </p:style>
-          </p:cxnSp>
-          <p:cxnSp>
-            <p:nvCxnSpPr>
-              <p:cNvPr id="17" name="Straight Connector 16">
-                <a:extLst>
-                  <a:ext uri="{FF2B5EF4-FFF2-40B4-BE49-F238E27FC236}">
-                    <a16:creationId xmlns:a16="http://schemas.microsoft.com/office/drawing/2014/main" id="{DB320BC5-72EA-9B44-A192-586F56319A8B}"/>
-                  </a:ext>
-                </a:extLst>
-              </p:cNvPr>
-              <p:cNvCxnSpPr>
-                <a:cxnSpLocks/>
-              </p:cNvCxnSpPr>
-              <p:nvPr/>
-            </p:nvCxnSpPr>
-            <p:spPr>
-              <a:xfrm>
-                <a:off x="4711901" y="1884307"/>
-                <a:ext cx="2963395" cy="0"/>
-              </a:xfrm>
-              <a:prstGeom prst="line">
-                <a:avLst/>
-              </a:prstGeom>
-              <a:ln w="38100">
-                <a:solidFill>
-                  <a:srgbClr val="5094E3"/>
-                </a:solidFill>
-              </a:ln>
-            </p:spPr>
-            <p:style>
-              <a:lnRef idx="1">
-                <a:schemeClr val="accent1"/>
-              </a:lnRef>
-              <a:fillRef idx="0">
-                <a:schemeClr val="accent1"/>
-              </a:fillRef>
-              <a:effectRef idx="0">
-                <a:schemeClr val="accent1"/>
-              </a:effectRef>
-              <a:fontRef idx="minor">
-                <a:schemeClr val="tx1"/>
-              </a:fontRef>
-            </p:style>
-          </p:cxnSp>
-          <p:sp>
-            <p:nvSpPr>
-              <p:cNvPr id="18" name="TextBox 17">
-                <a:extLst>
-                  <a:ext uri="{FF2B5EF4-FFF2-40B4-BE49-F238E27FC236}">
-                    <a16:creationId xmlns:a16="http://schemas.microsoft.com/office/drawing/2014/main" id="{810A6AB5-4A74-2946-ABF3-347E45166ABC}"/>
-                  </a:ext>
-                </a:extLst>
-              </p:cNvPr>
-              <p:cNvSpPr txBox="1"/>
-              <p:nvPr/>
-            </p:nvSpPr>
-            <p:spPr>
-              <a:xfrm rot="16200000">
-                <a:off x="5902097" y="2010449"/>
-                <a:ext cx="431528" cy="246221"/>
-              </a:xfrm>
-              <a:prstGeom prst="rect">
-                <a:avLst/>
-              </a:prstGeom>
-              <a:noFill/>
-            </p:spPr>
-            <p:txBody>
-              <a:bodyPr wrap="none" rtlCol="0">
-                <a:spAutoFit/>
-              </a:bodyPr>
-              <a:lstStyle/>
-              <a:p>
-                <a:pPr algn="r"/>
-                <a:r>
-                  <a:rPr lang="en-US" sz="1000" dirty="0">
-                    <a:latin typeface="Arial" panose="020B0604020202020204" pitchFamily="34" charset="0"/>
-                    <a:cs typeface="Arial" panose="020B0604020202020204" pitchFamily="34" charset="0"/>
-                  </a:rPr>
-                  <a:t>1.22</a:t>
-                </a:r>
-              </a:p>
-            </p:txBody>
-          </p:sp>
-        </p:grpSp>
-        <p:grpSp>
-          <p:nvGrpSpPr>
-            <p:cNvPr id="53" name="Group 52">
-              <a:extLst>
-                <a:ext uri="{FF2B5EF4-FFF2-40B4-BE49-F238E27FC236}">
-                  <a16:creationId xmlns:a16="http://schemas.microsoft.com/office/drawing/2014/main" id="{F8EB6FD4-0FDC-BE4E-A6C0-106F126CBC8B}"/>
-                </a:ext>
-              </a:extLst>
-            </p:cNvPr>
-            <p:cNvGrpSpPr/>
-            <p:nvPr/>
-          </p:nvGrpSpPr>
-          <p:grpSpPr>
-            <a:xfrm>
-              <a:off x="740630" y="538980"/>
-              <a:ext cx="2025232" cy="1793037"/>
-              <a:chOff x="740630" y="538980"/>
-              <a:chExt cx="2025232" cy="1793037"/>
-            </a:xfrm>
-          </p:grpSpPr>
-          <p:cxnSp>
-            <p:nvCxnSpPr>
-              <p:cNvPr id="13" name="Straight Connector 12">
-                <a:extLst>
-                  <a:ext uri="{FF2B5EF4-FFF2-40B4-BE49-F238E27FC236}">
-                    <a16:creationId xmlns:a16="http://schemas.microsoft.com/office/drawing/2014/main" id="{DE10BD1B-143C-674B-AF18-F759DE0AD203}"/>
-                  </a:ext>
-                </a:extLst>
-              </p:cNvPr>
-              <p:cNvCxnSpPr>
-                <a:cxnSpLocks/>
-              </p:cNvCxnSpPr>
-              <p:nvPr/>
-            </p:nvCxnSpPr>
-            <p:spPr>
-              <a:xfrm>
-                <a:off x="2504717" y="1884307"/>
-                <a:ext cx="212506" cy="0"/>
-              </a:xfrm>
-              <a:prstGeom prst="line">
-                <a:avLst/>
-              </a:prstGeom>
-              <a:ln w="38100">
-                <a:solidFill>
-                  <a:srgbClr val="4770EB"/>
-                </a:solidFill>
-              </a:ln>
-            </p:spPr>
-            <p:style>
-              <a:lnRef idx="1">
-                <a:schemeClr val="accent1"/>
-              </a:lnRef>
-              <a:fillRef idx="0">
-                <a:schemeClr val="accent1"/>
-              </a:fillRef>
-              <a:effectRef idx="0">
-                <a:schemeClr val="accent1"/>
-              </a:effectRef>
-              <a:fontRef idx="minor">
-                <a:schemeClr val="tx1"/>
-              </a:fontRef>
-            </p:style>
-          </p:cxnSp>
-          <p:sp>
-            <p:nvSpPr>
-              <p:cNvPr id="19" name="TextBox 18">
-                <a:extLst>
-                  <a:ext uri="{FF2B5EF4-FFF2-40B4-BE49-F238E27FC236}">
-                    <a16:creationId xmlns:a16="http://schemas.microsoft.com/office/drawing/2014/main" id="{BA8174E6-CDB2-484A-92FC-293E4CE825E8}"/>
-                  </a:ext>
-                </a:extLst>
-              </p:cNvPr>
-              <p:cNvSpPr txBox="1"/>
-              <p:nvPr/>
-            </p:nvSpPr>
-            <p:spPr>
-              <a:xfrm rot="16200000">
-                <a:off x="647977" y="1984562"/>
-                <a:ext cx="431528" cy="246221"/>
-              </a:xfrm>
-              <a:prstGeom prst="rect">
-                <a:avLst/>
-              </a:prstGeom>
-              <a:noFill/>
-            </p:spPr>
-            <p:txBody>
-              <a:bodyPr wrap="none" rtlCol="0">
-                <a:spAutoFit/>
-              </a:bodyPr>
-              <a:lstStyle/>
-              <a:p>
-                <a:pPr algn="r"/>
-                <a:r>
-                  <a:rPr lang="en-US" sz="1000" dirty="0">
-                    <a:latin typeface="Arial" panose="020B0604020202020204" pitchFamily="34" charset="0"/>
-                    <a:cs typeface="Arial" panose="020B0604020202020204" pitchFamily="34" charset="0"/>
-                  </a:rPr>
-                  <a:t>0.04</a:t>
-                </a:r>
-              </a:p>
-            </p:txBody>
-          </p:sp>
-          <p:sp>
-            <p:nvSpPr>
-              <p:cNvPr id="20" name="TextBox 19">
-                <a:extLst>
-                  <a:ext uri="{FF2B5EF4-FFF2-40B4-BE49-F238E27FC236}">
-                    <a16:creationId xmlns:a16="http://schemas.microsoft.com/office/drawing/2014/main" id="{65C91DCF-C138-1F46-B416-880568F36177}"/>
-                  </a:ext>
-                </a:extLst>
-              </p:cNvPr>
-              <p:cNvSpPr txBox="1"/>
-              <p:nvPr/>
-            </p:nvSpPr>
-            <p:spPr>
-              <a:xfrm rot="16200000">
-                <a:off x="1258166" y="1990116"/>
-                <a:ext cx="431528" cy="246221"/>
-              </a:xfrm>
-              <a:prstGeom prst="rect">
-                <a:avLst/>
-              </a:prstGeom>
-              <a:noFill/>
-            </p:spPr>
-            <p:txBody>
-              <a:bodyPr wrap="none" rtlCol="0">
-                <a:spAutoFit/>
-              </a:bodyPr>
-              <a:lstStyle/>
-              <a:p>
-                <a:pPr algn="r"/>
-                <a:r>
-                  <a:rPr lang="en-US" sz="1000" dirty="0">
-                    <a:latin typeface="Arial" panose="020B0604020202020204" pitchFamily="34" charset="0"/>
-                    <a:cs typeface="Arial" panose="020B0604020202020204" pitchFamily="34" charset="0"/>
-                  </a:rPr>
-                  <a:t>0.40</a:t>
-                </a:r>
-              </a:p>
-            </p:txBody>
-          </p:sp>
-          <p:cxnSp>
-            <p:nvCxnSpPr>
-              <p:cNvPr id="22" name="Straight Connector 21">
-                <a:extLst>
-                  <a:ext uri="{FF2B5EF4-FFF2-40B4-BE49-F238E27FC236}">
-                    <a16:creationId xmlns:a16="http://schemas.microsoft.com/office/drawing/2014/main" id="{E3E5EC5E-41E0-934B-BC1B-4200E1F3B2AB}"/>
-                  </a:ext>
-                </a:extLst>
-              </p:cNvPr>
-              <p:cNvCxnSpPr>
-                <a:cxnSpLocks/>
-              </p:cNvCxnSpPr>
-              <p:nvPr/>
-            </p:nvCxnSpPr>
-            <p:spPr>
-              <a:xfrm>
-                <a:off x="913001" y="1332162"/>
-                <a:ext cx="0" cy="565239"/>
-              </a:xfrm>
-              <a:prstGeom prst="line">
-                <a:avLst/>
-              </a:prstGeom>
-              <a:ln w="9525" cap="flat" cmpd="sng" algn="ctr">
-                <a:solidFill>
-                  <a:schemeClr val="accent3"/>
-                </a:solidFill>
-                <a:prstDash val="dash"/>
-                <a:round/>
-                <a:headEnd type="none" w="med" len="med"/>
-                <a:tailEnd type="none" w="med" len="med"/>
-              </a:ln>
-            </p:spPr>
-            <p:style>
-              <a:lnRef idx="0">
-                <a:scrgbClr r="0" g="0" b="0"/>
-              </a:lnRef>
-              <a:fillRef idx="0">
-                <a:scrgbClr r="0" g="0" b="0"/>
-              </a:fillRef>
-              <a:effectRef idx="0">
-                <a:scrgbClr r="0" g="0" b="0"/>
-              </a:effectRef>
-              <a:fontRef idx="minor">
-                <a:schemeClr val="tx1"/>
-              </a:fontRef>
-            </p:style>
-          </p:cxnSp>
-          <p:cxnSp>
-            <p:nvCxnSpPr>
-              <p:cNvPr id="23" name="Straight Connector 22">
-                <a:extLst>
-                  <a:ext uri="{FF2B5EF4-FFF2-40B4-BE49-F238E27FC236}">
-                    <a16:creationId xmlns:a16="http://schemas.microsoft.com/office/drawing/2014/main" id="{BF1D1EC9-0591-8B49-8944-2E7C668D8107}"/>
-                  </a:ext>
-                </a:extLst>
-              </p:cNvPr>
-              <p:cNvCxnSpPr>
-                <a:cxnSpLocks/>
-              </p:cNvCxnSpPr>
-              <p:nvPr/>
-            </p:nvCxnSpPr>
-            <p:spPr>
-              <a:xfrm>
-                <a:off x="1910768" y="1136931"/>
-                <a:ext cx="0" cy="766364"/>
-              </a:xfrm>
-              <a:prstGeom prst="line">
-                <a:avLst/>
-              </a:prstGeom>
-              <a:ln w="9525" cap="flat" cmpd="sng" algn="ctr">
-                <a:solidFill>
-                  <a:schemeClr val="accent3"/>
-                </a:solidFill>
-                <a:prstDash val="dash"/>
-                <a:round/>
-                <a:headEnd type="none" w="med" len="med"/>
-                <a:tailEnd type="none" w="med" len="med"/>
-              </a:ln>
-            </p:spPr>
-            <p:style>
-              <a:lnRef idx="0">
-                <a:scrgbClr r="0" g="0" b="0"/>
-              </a:lnRef>
-              <a:fillRef idx="0">
-                <a:scrgbClr r="0" g="0" b="0"/>
-              </a:fillRef>
-              <a:effectRef idx="0">
-                <a:scrgbClr r="0" g="0" b="0"/>
-              </a:effectRef>
-              <a:fontRef idx="minor">
-                <a:schemeClr val="tx1"/>
-              </a:fontRef>
-            </p:style>
-          </p:cxnSp>
-          <p:cxnSp>
-            <p:nvCxnSpPr>
-              <p:cNvPr id="24" name="Straight Connector 23">
-                <a:extLst>
-                  <a:ext uri="{FF2B5EF4-FFF2-40B4-BE49-F238E27FC236}">
-                    <a16:creationId xmlns:a16="http://schemas.microsoft.com/office/drawing/2014/main" id="{07C7F62A-8695-2E44-AC91-E6FF0098014E}"/>
-                  </a:ext>
-                </a:extLst>
-              </p:cNvPr>
-              <p:cNvCxnSpPr>
-                <a:cxnSpLocks/>
-              </p:cNvCxnSpPr>
-              <p:nvPr/>
-            </p:nvCxnSpPr>
-            <p:spPr>
-              <a:xfrm>
-                <a:off x="2304257" y="841789"/>
-                <a:ext cx="0" cy="1052268"/>
-              </a:xfrm>
-              <a:prstGeom prst="line">
-                <a:avLst/>
-              </a:prstGeom>
-              <a:ln w="9525" cap="flat" cmpd="sng" algn="ctr">
-                <a:solidFill>
-                  <a:schemeClr val="accent3"/>
-                </a:solidFill>
-                <a:prstDash val="dash"/>
-                <a:round/>
-                <a:headEnd type="none" w="med" len="med"/>
-                <a:tailEnd type="none" w="med" len="med"/>
-              </a:ln>
-            </p:spPr>
-            <p:style>
-              <a:lnRef idx="0">
-                <a:scrgbClr r="0" g="0" b="0"/>
-              </a:lnRef>
-              <a:fillRef idx="0">
-                <a:scrgbClr r="0" g="0" b="0"/>
-              </a:fillRef>
-              <a:effectRef idx="0">
-                <a:scrgbClr r="0" g="0" b="0"/>
-              </a:effectRef>
-              <a:fontRef idx="minor">
-                <a:schemeClr val="tx1"/>
-              </a:fontRef>
-            </p:style>
-          </p:cxnSp>
-          <p:cxnSp>
-            <p:nvCxnSpPr>
-              <p:cNvPr id="25" name="Straight Connector 24">
-                <a:extLst>
-                  <a:ext uri="{FF2B5EF4-FFF2-40B4-BE49-F238E27FC236}">
-                    <a16:creationId xmlns:a16="http://schemas.microsoft.com/office/drawing/2014/main" id="{D987429E-BB0F-0F49-AF49-D099FC0385B8}"/>
-                  </a:ext>
-                </a:extLst>
-              </p:cNvPr>
-              <p:cNvCxnSpPr>
-                <a:cxnSpLocks/>
-              </p:cNvCxnSpPr>
-              <p:nvPr/>
-            </p:nvCxnSpPr>
-            <p:spPr>
-              <a:xfrm>
-                <a:off x="2480881" y="717593"/>
-                <a:ext cx="0" cy="1148698"/>
-              </a:xfrm>
-              <a:prstGeom prst="line">
-                <a:avLst/>
-              </a:prstGeom>
-              <a:ln w="9525" cap="flat" cmpd="sng" algn="ctr">
-                <a:solidFill>
-                  <a:schemeClr val="accent3"/>
-                </a:solidFill>
-                <a:prstDash val="dash"/>
-                <a:round/>
-                <a:headEnd type="none" w="med" len="med"/>
-                <a:tailEnd type="none" w="med" len="med"/>
-              </a:ln>
-            </p:spPr>
-            <p:style>
-              <a:lnRef idx="0">
-                <a:scrgbClr r="0" g="0" b="0"/>
-              </a:lnRef>
-              <a:fillRef idx="0">
-                <a:scrgbClr r="0" g="0" b="0"/>
-              </a:fillRef>
-              <a:effectRef idx="0">
-                <a:scrgbClr r="0" g="0" b="0"/>
-              </a:effectRef>
-              <a:fontRef idx="minor">
-                <a:schemeClr val="tx1"/>
-              </a:fontRef>
-            </p:style>
-          </p:cxnSp>
-          <p:cxnSp>
-            <p:nvCxnSpPr>
-              <p:cNvPr id="26" name="Straight Connector 25">
-                <a:extLst>
-                  <a:ext uri="{FF2B5EF4-FFF2-40B4-BE49-F238E27FC236}">
-                    <a16:creationId xmlns:a16="http://schemas.microsoft.com/office/drawing/2014/main" id="{86F5AF92-652D-4444-92DB-11F3D677CF68}"/>
-                  </a:ext>
-                </a:extLst>
-              </p:cNvPr>
-              <p:cNvCxnSpPr>
-                <a:cxnSpLocks/>
-              </p:cNvCxnSpPr>
-              <p:nvPr/>
-            </p:nvCxnSpPr>
-            <p:spPr>
-              <a:xfrm>
-                <a:off x="2713177" y="538980"/>
-                <a:ext cx="0" cy="1345327"/>
-              </a:xfrm>
-              <a:prstGeom prst="line">
-                <a:avLst/>
-              </a:prstGeom>
-              <a:ln w="9525" cap="flat" cmpd="sng" algn="ctr">
-                <a:solidFill>
-                  <a:schemeClr val="accent3"/>
-                </a:solidFill>
-                <a:prstDash val="dash"/>
-                <a:round/>
-                <a:headEnd type="none" w="med" len="med"/>
-                <a:tailEnd type="none" w="med" len="med"/>
-              </a:ln>
-            </p:spPr>
-            <p:style>
-              <a:lnRef idx="0">
-                <a:scrgbClr r="0" g="0" b="0"/>
-              </a:lnRef>
-              <a:fillRef idx="0">
-                <a:scrgbClr r="0" g="0" b="0"/>
-              </a:fillRef>
-              <a:effectRef idx="0">
-                <a:scrgbClr r="0" g="0" b="0"/>
-              </a:effectRef>
-              <a:fontRef idx="minor">
-                <a:schemeClr val="tx1"/>
-              </a:fontRef>
-            </p:style>
-          </p:cxnSp>
-          <p:cxnSp>
-            <p:nvCxnSpPr>
-              <p:cNvPr id="27" name="Straight Connector 26">
-                <a:extLst>
-                  <a:ext uri="{FF2B5EF4-FFF2-40B4-BE49-F238E27FC236}">
-                    <a16:creationId xmlns:a16="http://schemas.microsoft.com/office/drawing/2014/main" id="{6661FA0B-7A22-884A-842E-B6AE398F2FE4}"/>
-                  </a:ext>
-                </a:extLst>
-              </p:cNvPr>
-              <p:cNvCxnSpPr>
-                <a:cxnSpLocks/>
-              </p:cNvCxnSpPr>
-              <p:nvPr/>
-            </p:nvCxnSpPr>
-            <p:spPr>
-              <a:xfrm>
-                <a:off x="2099201" y="1017963"/>
-                <a:ext cx="0" cy="869372"/>
-              </a:xfrm>
-              <a:prstGeom prst="line">
-                <a:avLst/>
-              </a:prstGeom>
-              <a:ln w="9525" cap="flat" cmpd="sng" algn="ctr">
-                <a:solidFill>
-                  <a:schemeClr val="accent3"/>
-                </a:solidFill>
-                <a:prstDash val="dash"/>
-                <a:round/>
-                <a:headEnd type="none" w="med" len="med"/>
-                <a:tailEnd type="none" w="med" len="med"/>
-              </a:ln>
-            </p:spPr>
-            <p:style>
-              <a:lnRef idx="0">
-                <a:scrgbClr r="0" g="0" b="0"/>
-              </a:lnRef>
-              <a:fillRef idx="0">
-                <a:scrgbClr r="0" g="0" b="0"/>
-              </a:fillRef>
-              <a:effectRef idx="0">
-                <a:scrgbClr r="0" g="0" b="0"/>
-              </a:effectRef>
-              <a:fontRef idx="minor">
-                <a:schemeClr val="tx1"/>
-              </a:fontRef>
-            </p:style>
-          </p:cxnSp>
-          <p:cxnSp>
-            <p:nvCxnSpPr>
-              <p:cNvPr id="29" name="Straight Connector 28">
-                <a:extLst>
-                  <a:ext uri="{FF2B5EF4-FFF2-40B4-BE49-F238E27FC236}">
-                    <a16:creationId xmlns:a16="http://schemas.microsoft.com/office/drawing/2014/main" id="{C9680E84-9DA0-5A44-88D5-C36015CAB792}"/>
-                  </a:ext>
-                </a:extLst>
-              </p:cNvPr>
-              <p:cNvCxnSpPr>
-                <a:cxnSpLocks/>
-              </p:cNvCxnSpPr>
-              <p:nvPr/>
-            </p:nvCxnSpPr>
-            <p:spPr>
-              <a:xfrm>
-                <a:off x="942876" y="1887335"/>
-                <a:ext cx="969264" cy="0"/>
-              </a:xfrm>
-              <a:prstGeom prst="line">
-                <a:avLst/>
-              </a:prstGeom>
-              <a:ln w="38100">
-                <a:solidFill>
-                  <a:srgbClr val="4770EB"/>
-                </a:solidFill>
-              </a:ln>
-            </p:spPr>
-            <p:style>
-              <a:lnRef idx="1">
-                <a:schemeClr val="accent1"/>
-              </a:lnRef>
-              <a:fillRef idx="0">
-                <a:schemeClr val="accent1"/>
-              </a:fillRef>
-              <a:effectRef idx="0">
-                <a:schemeClr val="accent1"/>
-              </a:effectRef>
-              <a:fontRef idx="minor">
-                <a:schemeClr val="tx1"/>
-              </a:fontRef>
-            </p:style>
-          </p:cxnSp>
-          <p:cxnSp>
-            <p:nvCxnSpPr>
-              <p:cNvPr id="31" name="Straight Connector 30">
-                <a:extLst>
-                  <a:ext uri="{FF2B5EF4-FFF2-40B4-BE49-F238E27FC236}">
-                    <a16:creationId xmlns:a16="http://schemas.microsoft.com/office/drawing/2014/main" id="{594C7CDC-830D-D24F-9929-601B3310530F}"/>
-                  </a:ext>
-                </a:extLst>
-              </p:cNvPr>
-              <p:cNvCxnSpPr>
-                <a:cxnSpLocks/>
-              </p:cNvCxnSpPr>
-              <p:nvPr/>
-            </p:nvCxnSpPr>
-            <p:spPr>
-              <a:xfrm>
-                <a:off x="1939090" y="1887335"/>
-                <a:ext cx="164592" cy="0"/>
-              </a:xfrm>
-              <a:prstGeom prst="line">
-                <a:avLst/>
-              </a:prstGeom>
-              <a:ln w="38100">
-                <a:solidFill>
-                  <a:srgbClr val="4770EB"/>
-                </a:solidFill>
-              </a:ln>
-            </p:spPr>
-            <p:style>
-              <a:lnRef idx="1">
-                <a:schemeClr val="accent1"/>
-              </a:lnRef>
-              <a:fillRef idx="0">
-                <a:schemeClr val="accent1"/>
-              </a:fillRef>
-              <a:effectRef idx="0">
-                <a:schemeClr val="accent1"/>
-              </a:effectRef>
-              <a:fontRef idx="minor">
-                <a:schemeClr val="tx1"/>
-              </a:fontRef>
-            </p:style>
-          </p:cxnSp>
-          <p:cxnSp>
-            <p:nvCxnSpPr>
-              <p:cNvPr id="32" name="Straight Connector 31">
-                <a:extLst>
-                  <a:ext uri="{FF2B5EF4-FFF2-40B4-BE49-F238E27FC236}">
-                    <a16:creationId xmlns:a16="http://schemas.microsoft.com/office/drawing/2014/main" id="{C4CB66AC-BBBB-B148-B0F1-5880003F89C8}"/>
-                  </a:ext>
-                </a:extLst>
-              </p:cNvPr>
-              <p:cNvCxnSpPr>
-                <a:cxnSpLocks/>
-              </p:cNvCxnSpPr>
-              <p:nvPr/>
-            </p:nvCxnSpPr>
-            <p:spPr>
-              <a:xfrm>
-                <a:off x="2127523" y="1887335"/>
-                <a:ext cx="182880" cy="0"/>
-              </a:xfrm>
-              <a:prstGeom prst="line">
-                <a:avLst/>
-              </a:prstGeom>
-              <a:ln w="38100">
-                <a:solidFill>
-                  <a:srgbClr val="4770EB"/>
-                </a:solidFill>
-              </a:ln>
-            </p:spPr>
-            <p:style>
-              <a:lnRef idx="1">
-                <a:schemeClr val="accent1"/>
-              </a:lnRef>
-              <a:fillRef idx="0">
-                <a:schemeClr val="accent1"/>
-              </a:fillRef>
-              <a:effectRef idx="0">
-                <a:schemeClr val="accent1"/>
-              </a:effectRef>
-              <a:fontRef idx="minor">
-                <a:schemeClr val="tx1"/>
-              </a:fontRef>
-            </p:style>
-          </p:cxnSp>
-          <p:sp>
-            <p:nvSpPr>
-              <p:cNvPr id="33" name="TextBox 32">
-                <a:extLst>
-                  <a:ext uri="{FF2B5EF4-FFF2-40B4-BE49-F238E27FC236}">
-                    <a16:creationId xmlns:a16="http://schemas.microsoft.com/office/drawing/2014/main" id="{73A1F31E-2325-1C47-BF4A-DD2F7EEE3429}"/>
-                  </a:ext>
-                </a:extLst>
-              </p:cNvPr>
-              <p:cNvSpPr txBox="1"/>
-              <p:nvPr/>
-            </p:nvSpPr>
-            <p:spPr>
-              <a:xfrm rot="16200000">
-                <a:off x="2006145" y="1990115"/>
-                <a:ext cx="431528" cy="246221"/>
-              </a:xfrm>
-              <a:prstGeom prst="rect">
-                <a:avLst/>
-              </a:prstGeom>
-              <a:noFill/>
-            </p:spPr>
-            <p:txBody>
-              <a:bodyPr wrap="none" rtlCol="0">
-                <a:spAutoFit/>
-              </a:bodyPr>
-              <a:lstStyle/>
-              <a:p>
-                <a:pPr algn="r"/>
-                <a:r>
-                  <a:rPr lang="en-US" sz="1000" dirty="0">
-                    <a:latin typeface="Arial" panose="020B0604020202020204" pitchFamily="34" charset="0"/>
-                    <a:cs typeface="Arial" panose="020B0604020202020204" pitchFamily="34" charset="0"/>
-                  </a:rPr>
-                  <a:t>0.10</a:t>
-                </a:r>
-              </a:p>
-            </p:txBody>
-          </p:sp>
-          <p:sp>
-            <p:nvSpPr>
-              <p:cNvPr id="34" name="TextBox 33">
-                <a:extLst>
-                  <a:ext uri="{FF2B5EF4-FFF2-40B4-BE49-F238E27FC236}">
-                    <a16:creationId xmlns:a16="http://schemas.microsoft.com/office/drawing/2014/main" id="{F2F68496-76AF-9847-9B03-EA0013EE29D1}"/>
-                  </a:ext>
-                </a:extLst>
-              </p:cNvPr>
-              <p:cNvSpPr txBox="1"/>
-              <p:nvPr/>
-            </p:nvSpPr>
-            <p:spPr>
-              <a:xfrm rot="16200000">
-                <a:off x="2202916" y="1993142"/>
-                <a:ext cx="431528" cy="246221"/>
-              </a:xfrm>
-              <a:prstGeom prst="rect">
-                <a:avLst/>
-              </a:prstGeom>
-              <a:noFill/>
-            </p:spPr>
-            <p:txBody>
-              <a:bodyPr wrap="none" rtlCol="0">
-                <a:spAutoFit/>
-              </a:bodyPr>
-              <a:lstStyle/>
-              <a:p>
-                <a:pPr algn="r"/>
-                <a:r>
-                  <a:rPr lang="en-US" sz="1000" dirty="0">
-                    <a:latin typeface="Arial" panose="020B0604020202020204" pitchFamily="34" charset="0"/>
-                    <a:cs typeface="Arial" panose="020B0604020202020204" pitchFamily="34" charset="0"/>
-                  </a:rPr>
-                  <a:t>0.07</a:t>
-                </a:r>
-              </a:p>
-            </p:txBody>
-          </p:sp>
-          <p:cxnSp>
-            <p:nvCxnSpPr>
-              <p:cNvPr id="38" name="Straight Connector 37">
-                <a:extLst>
-                  <a:ext uri="{FF2B5EF4-FFF2-40B4-BE49-F238E27FC236}">
-                    <a16:creationId xmlns:a16="http://schemas.microsoft.com/office/drawing/2014/main" id="{8790BABC-5057-974B-A667-F71424F0971F}"/>
-                  </a:ext>
-                </a:extLst>
-              </p:cNvPr>
-              <p:cNvCxnSpPr>
-                <a:cxnSpLocks/>
-              </p:cNvCxnSpPr>
-              <p:nvPr/>
-            </p:nvCxnSpPr>
-            <p:spPr>
-              <a:xfrm>
-                <a:off x="821172" y="1887335"/>
-                <a:ext cx="95402" cy="0"/>
-              </a:xfrm>
-              <a:prstGeom prst="line">
-                <a:avLst/>
-              </a:prstGeom>
-              <a:ln w="38100">
-                <a:solidFill>
-                  <a:srgbClr val="4770EB"/>
-                </a:solidFill>
-              </a:ln>
-            </p:spPr>
-            <p:style>
-              <a:lnRef idx="1">
-                <a:schemeClr val="accent1"/>
-              </a:lnRef>
-              <a:fillRef idx="0">
-                <a:schemeClr val="accent1"/>
-              </a:fillRef>
-              <a:effectRef idx="0">
-                <a:schemeClr val="accent1"/>
-              </a:effectRef>
-              <a:fontRef idx="minor">
-                <a:schemeClr val="tx1"/>
-              </a:fontRef>
-            </p:style>
-          </p:cxnSp>
-          <p:cxnSp>
-            <p:nvCxnSpPr>
-              <p:cNvPr id="47" name="Straight Connector 46">
-                <a:extLst>
-                  <a:ext uri="{FF2B5EF4-FFF2-40B4-BE49-F238E27FC236}">
-                    <a16:creationId xmlns:a16="http://schemas.microsoft.com/office/drawing/2014/main" id="{638CDDA3-100C-B546-AB64-9915A894D7D8}"/>
-                  </a:ext>
-                </a:extLst>
-              </p:cNvPr>
-              <p:cNvCxnSpPr>
-                <a:cxnSpLocks/>
-              </p:cNvCxnSpPr>
-              <p:nvPr/>
-            </p:nvCxnSpPr>
-            <p:spPr>
-              <a:xfrm>
-                <a:off x="2334552" y="1884307"/>
-                <a:ext cx="148539" cy="0"/>
-              </a:xfrm>
-              <a:prstGeom prst="line">
-                <a:avLst/>
-              </a:prstGeom>
-              <a:ln w="38100">
-                <a:solidFill>
-                  <a:srgbClr val="4770EB"/>
-                </a:solidFill>
-              </a:ln>
-            </p:spPr>
-            <p:style>
-              <a:lnRef idx="1">
-                <a:schemeClr val="accent1"/>
-              </a:lnRef>
-              <a:fillRef idx="0">
-                <a:schemeClr val="accent1"/>
-              </a:fillRef>
-              <a:effectRef idx="0">
-                <a:schemeClr val="accent1"/>
-              </a:effectRef>
-              <a:fontRef idx="minor">
-                <a:schemeClr val="tx1"/>
-              </a:fontRef>
-            </p:style>
-          </p:cxnSp>
-          <p:sp>
-            <p:nvSpPr>
-              <p:cNvPr id="51" name="TextBox 50">
-                <a:extLst>
-                  <a:ext uri="{FF2B5EF4-FFF2-40B4-BE49-F238E27FC236}">
-                    <a16:creationId xmlns:a16="http://schemas.microsoft.com/office/drawing/2014/main" id="{BE8E285E-3BC9-E444-AD04-1FDBA4B1E1B0}"/>
-                  </a:ext>
-                </a:extLst>
-              </p:cNvPr>
-              <p:cNvSpPr txBox="1"/>
-              <p:nvPr/>
-            </p:nvSpPr>
-            <p:spPr>
-              <a:xfrm rot="16200000">
-                <a:off x="1788649" y="1991704"/>
-                <a:ext cx="431528" cy="246221"/>
-              </a:xfrm>
-              <a:prstGeom prst="rect">
-                <a:avLst/>
-              </a:prstGeom>
-              <a:noFill/>
-            </p:spPr>
-            <p:txBody>
-              <a:bodyPr wrap="none" rtlCol="0">
-                <a:spAutoFit/>
-              </a:bodyPr>
-              <a:lstStyle/>
-              <a:p>
-                <a:pPr algn="r"/>
-                <a:r>
-                  <a:rPr lang="en-US" sz="1000" dirty="0">
-                    <a:latin typeface="Arial" panose="020B0604020202020204" pitchFamily="34" charset="0"/>
-                    <a:cs typeface="Arial" panose="020B0604020202020204" pitchFamily="34" charset="0"/>
-                  </a:rPr>
-                  <a:t>0.08</a:t>
-                </a:r>
-              </a:p>
-            </p:txBody>
-          </p:sp>
-          <p:sp>
-            <p:nvSpPr>
-              <p:cNvPr id="52" name="TextBox 51">
-                <a:extLst>
-                  <a:ext uri="{FF2B5EF4-FFF2-40B4-BE49-F238E27FC236}">
-                    <a16:creationId xmlns:a16="http://schemas.microsoft.com/office/drawing/2014/main" id="{C399B031-BBF1-3749-A559-A678B280DF59}"/>
-                  </a:ext>
-                </a:extLst>
-              </p:cNvPr>
-              <p:cNvSpPr txBox="1"/>
-              <p:nvPr/>
-            </p:nvSpPr>
-            <p:spPr>
-              <a:xfrm rot="16200000">
-                <a:off x="2426988" y="1990114"/>
-                <a:ext cx="431528" cy="246221"/>
-              </a:xfrm>
-              <a:prstGeom prst="rect">
-                <a:avLst/>
-              </a:prstGeom>
-              <a:noFill/>
-            </p:spPr>
-            <p:txBody>
-              <a:bodyPr wrap="none" rtlCol="0">
-                <a:spAutoFit/>
-              </a:bodyPr>
-              <a:lstStyle/>
-              <a:p>
-                <a:pPr algn="r"/>
-                <a:r>
-                  <a:rPr lang="en-US" sz="1000" dirty="0">
-                    <a:latin typeface="Arial" panose="020B0604020202020204" pitchFamily="34" charset="0"/>
-                    <a:cs typeface="Arial" panose="020B0604020202020204" pitchFamily="34" charset="0"/>
-                  </a:rPr>
-                  <a:t>0.10</a:t>
-                </a:r>
-              </a:p>
-            </p:txBody>
-          </p:sp>
-        </p:grpSp>
-        <p:cxnSp>
-          <p:nvCxnSpPr>
-            <p:cNvPr id="59" name="Straight Connector 58">
-              <a:extLst>
-                <a:ext uri="{FF2B5EF4-FFF2-40B4-BE49-F238E27FC236}">
-                  <a16:creationId xmlns:a16="http://schemas.microsoft.com/office/drawing/2014/main" id="{FF757C21-E79D-C940-B9E8-13D09D77FCF6}"/>
-                </a:ext>
-              </a:extLst>
-            </p:cNvPr>
-            <p:cNvCxnSpPr>
-              <a:cxnSpLocks/>
-            </p:cNvCxnSpPr>
-            <p:nvPr/>
-          </p:nvCxnSpPr>
-          <p:spPr>
-            <a:xfrm>
-              <a:off x="8727260" y="1291942"/>
-              <a:ext cx="0" cy="592365"/>
-            </a:xfrm>
-            <a:prstGeom prst="line">
-              <a:avLst/>
-            </a:prstGeom>
-            <a:ln w="9525" cap="flat" cmpd="sng" algn="ctr">
-              <a:solidFill>
-                <a:schemeClr val="accent3"/>
-              </a:solidFill>
-              <a:prstDash val="dash"/>
-              <a:round/>
-              <a:headEnd type="none" w="med" len="med"/>
-              <a:tailEnd type="none" w="med" len="med"/>
-            </a:ln>
-          </p:spPr>
-          <p:style>
-            <a:lnRef idx="0">
-              <a:scrgbClr r="0" g="0" b="0"/>
-            </a:lnRef>
-            <a:fillRef idx="0">
-              <a:scrgbClr r="0" g="0" b="0"/>
-            </a:fillRef>
-            <a:effectRef idx="0">
-              <a:scrgbClr r="0" g="0" b="0"/>
-            </a:effectRef>
-            <a:fontRef idx="minor">
-              <a:schemeClr val="tx1"/>
-            </a:fontRef>
-          </p:style>
-        </p:cxnSp>
-        <p:cxnSp>
-          <p:nvCxnSpPr>
-            <p:cNvPr id="57" name="Straight Connector 56">
-              <a:extLst>
-                <a:ext uri="{FF2B5EF4-FFF2-40B4-BE49-F238E27FC236}">
-                  <a16:creationId xmlns:a16="http://schemas.microsoft.com/office/drawing/2014/main" id="{BDCF1341-9159-2348-B79E-9022DFFC8DA6}"/>
-                </a:ext>
-              </a:extLst>
-            </p:cNvPr>
-            <p:cNvCxnSpPr>
-              <a:cxnSpLocks/>
-            </p:cNvCxnSpPr>
-            <p:nvPr/>
-          </p:nvCxnSpPr>
-          <p:spPr>
-            <a:xfrm>
-              <a:off x="8561919" y="1884307"/>
-              <a:ext cx="169936" cy="0"/>
-            </a:xfrm>
-            <a:prstGeom prst="line">
-              <a:avLst/>
-            </a:prstGeom>
-            <a:ln w="38100">
-              <a:solidFill>
-                <a:srgbClr val="FF8C3A"/>
-              </a:solidFill>
-            </a:ln>
-          </p:spPr>
-          <p:style>
-            <a:lnRef idx="1">
-              <a:schemeClr val="accent1"/>
-            </a:lnRef>
-            <a:fillRef idx="0">
-              <a:schemeClr val="accent1"/>
-            </a:fillRef>
-            <a:effectRef idx="0">
-              <a:schemeClr val="accent1"/>
-            </a:effectRef>
-            <a:fontRef idx="minor">
-              <a:schemeClr val="tx1"/>
-            </a:fontRef>
-          </p:style>
-        </p:cxnSp>
-        <p:cxnSp>
-          <p:nvCxnSpPr>
-            <p:cNvPr id="61" name="Straight Connector 60">
-              <a:extLst>
-                <a:ext uri="{FF2B5EF4-FFF2-40B4-BE49-F238E27FC236}">
-                  <a16:creationId xmlns:a16="http://schemas.microsoft.com/office/drawing/2014/main" id="{9A5448E8-C407-7D4D-BA56-0D65841258DC}"/>
-                </a:ext>
-              </a:extLst>
-            </p:cNvPr>
-            <p:cNvCxnSpPr>
-              <a:cxnSpLocks/>
-            </p:cNvCxnSpPr>
-            <p:nvPr/>
-          </p:nvCxnSpPr>
-          <p:spPr>
-            <a:xfrm>
-              <a:off x="8759425" y="1882886"/>
-              <a:ext cx="1875515" cy="0"/>
-            </a:xfrm>
-            <a:prstGeom prst="line">
-              <a:avLst/>
-            </a:prstGeom>
-            <a:ln w="38100">
-              <a:solidFill>
-                <a:srgbClr val="FF8C3A"/>
-              </a:solidFill>
-            </a:ln>
-          </p:spPr>
-          <p:style>
-            <a:lnRef idx="1">
-              <a:schemeClr val="accent1"/>
-            </a:lnRef>
-            <a:fillRef idx="0">
-              <a:schemeClr val="accent1"/>
-            </a:fillRef>
-            <a:effectRef idx="0">
-              <a:schemeClr val="accent1"/>
-            </a:effectRef>
-            <a:fontRef idx="minor">
-              <a:schemeClr val="tx1"/>
-            </a:fontRef>
-          </p:style>
-        </p:cxnSp>
-        <p:cxnSp>
-          <p:nvCxnSpPr>
-            <p:cNvPr id="62" name="Straight Connector 61">
-              <a:extLst>
-                <a:ext uri="{FF2B5EF4-FFF2-40B4-BE49-F238E27FC236}">
-                  <a16:creationId xmlns:a16="http://schemas.microsoft.com/office/drawing/2014/main" id="{F9F92E86-51A1-8E47-B824-F41004A2AF7E}"/>
-                </a:ext>
-              </a:extLst>
-            </p:cNvPr>
-            <p:cNvCxnSpPr>
-              <a:cxnSpLocks/>
-            </p:cNvCxnSpPr>
-            <p:nvPr/>
-          </p:nvCxnSpPr>
-          <p:spPr>
-            <a:xfrm>
-              <a:off x="10630345" y="1161061"/>
-              <a:ext cx="0" cy="709825"/>
-            </a:xfrm>
-            <a:prstGeom prst="line">
-              <a:avLst/>
-            </a:prstGeom>
-            <a:ln w="9525" cap="flat" cmpd="sng" algn="ctr">
-              <a:solidFill>
-                <a:schemeClr val="accent3"/>
-              </a:solidFill>
-              <a:prstDash val="dash"/>
-              <a:round/>
-              <a:headEnd type="none" w="med" len="med"/>
-              <a:tailEnd type="none" w="med" len="med"/>
-            </a:ln>
-          </p:spPr>
-          <p:style>
-            <a:lnRef idx="0">
-              <a:scrgbClr r="0" g="0" b="0"/>
-            </a:lnRef>
-            <a:fillRef idx="0">
-              <a:scrgbClr r="0" g="0" b="0"/>
-            </a:fillRef>
-            <a:effectRef idx="0">
-              <a:scrgbClr r="0" g="0" b="0"/>
-            </a:effectRef>
-            <a:fontRef idx="minor">
-              <a:schemeClr val="tx1"/>
-            </a:fontRef>
-          </p:style>
-        </p:cxnSp>
-        <p:sp>
-          <p:nvSpPr>
-            <p:cNvPr id="65" name="TextBox 64">
-              <a:extLst>
-                <a:ext uri="{FF2B5EF4-FFF2-40B4-BE49-F238E27FC236}">
-                  <a16:creationId xmlns:a16="http://schemas.microsoft.com/office/drawing/2014/main" id="{8D2B3066-CC03-DC48-8262-4A954750D7B7}"/>
-                </a:ext>
-              </a:extLst>
-            </p:cNvPr>
-            <p:cNvSpPr txBox="1"/>
-            <p:nvPr/>
-          </p:nvSpPr>
-          <p:spPr>
-            <a:xfrm rot="16200000">
-              <a:off x="8420552" y="1970714"/>
-              <a:ext cx="431528" cy="246221"/>
-            </a:xfrm>
-            <a:prstGeom prst="rect">
-              <a:avLst/>
-            </a:prstGeom>
-            <a:noFill/>
-          </p:spPr>
-          <p:txBody>
-            <a:bodyPr wrap="none" rtlCol="0">
-              <a:spAutoFit/>
-            </a:bodyPr>
-            <a:lstStyle/>
-            <a:p>
-              <a:pPr algn="r"/>
-              <a:r>
-                <a:rPr lang="en-US" sz="1000" dirty="0">
-                  <a:latin typeface="Arial" panose="020B0604020202020204" pitchFamily="34" charset="0"/>
-                  <a:cs typeface="Arial" panose="020B0604020202020204" pitchFamily="34" charset="0"/>
-                </a:rPr>
-                <a:t>0.08</a:t>
-              </a:r>
-            </a:p>
-          </p:txBody>
-        </p:sp>
-        <p:sp>
-          <p:nvSpPr>
-            <p:cNvPr id="66" name="TextBox 65">
-              <a:extLst>
-                <a:ext uri="{FF2B5EF4-FFF2-40B4-BE49-F238E27FC236}">
-                  <a16:creationId xmlns:a16="http://schemas.microsoft.com/office/drawing/2014/main" id="{28164FDA-1255-E047-8548-647411F83ECB}"/>
-                </a:ext>
-              </a:extLst>
-            </p:cNvPr>
-            <p:cNvSpPr txBox="1"/>
-            <p:nvPr/>
-          </p:nvSpPr>
-          <p:spPr>
-            <a:xfrm rot="16200000">
-              <a:off x="9504682" y="1970714"/>
-              <a:ext cx="431528" cy="246221"/>
-            </a:xfrm>
-            <a:prstGeom prst="rect">
-              <a:avLst/>
-            </a:prstGeom>
-            <a:noFill/>
-          </p:spPr>
-          <p:txBody>
-            <a:bodyPr wrap="none" rtlCol="0">
-              <a:spAutoFit/>
-            </a:bodyPr>
-            <a:lstStyle/>
-            <a:p>
-              <a:pPr algn="r"/>
-              <a:r>
-                <a:rPr lang="en-US" sz="1000" dirty="0">
-                  <a:latin typeface="Arial" panose="020B0604020202020204" pitchFamily="34" charset="0"/>
-                  <a:cs typeface="Arial" panose="020B0604020202020204" pitchFamily="34" charset="0"/>
-                </a:rPr>
-                <a:t>0.79</a:t>
-              </a:r>
-            </a:p>
-          </p:txBody>
-        </p:sp>
-      </p:grpSp>
-      <p:pic>
-        <p:nvPicPr>
-          <p:cNvPr id="4" name="Picture 3">
-            <a:extLst>
-              <a:ext uri="{FF2B5EF4-FFF2-40B4-BE49-F238E27FC236}">
-                <a16:creationId xmlns:a16="http://schemas.microsoft.com/office/drawing/2014/main" id="{C87C8356-34BF-C248-A92B-02AD47F59FBF}"/>
+                <a16:creationId xmlns:a16="http://schemas.microsoft.com/office/drawing/2014/main" id="{360B8B01-BD98-6843-8FBE-5402ABCF8DBB}"/>
               </a:ext>
             </a:extLst>
           </p:cNvPr>
@@ -4278,45 +2981,15 @@
           <p:nvPr/>
         </p:nvPicPr>
         <p:blipFill>
-          <a:blip r:embed="rId3"/>
+          <a:blip r:embed="rId2"/>
           <a:stretch>
             <a:fillRect/>
           </a:stretch>
         </p:blipFill>
         <p:spPr>
           <a:xfrm>
-            <a:off x="0" y="2377057"/>
-            <a:ext cx="12192000" cy="3126674"/>
-          </a:xfrm>
-          <a:prstGeom prst="rect">
-            <a:avLst/>
-          </a:prstGeom>
-        </p:spPr>
-      </p:pic>
-      <p:pic>
-        <p:nvPicPr>
-          <p:cNvPr id="8" name="Picture 7">
-            <a:extLst>
-              <a:ext uri="{FF2B5EF4-FFF2-40B4-BE49-F238E27FC236}">
-                <a16:creationId xmlns:a16="http://schemas.microsoft.com/office/drawing/2014/main" id="{4622B73B-5FD5-8C44-BA31-EDB3B775818C}"/>
-              </a:ext>
-            </a:extLst>
-          </p:cNvPr>
-          <p:cNvPicPr>
-            <a:picLocks noChangeAspect="1"/>
-          </p:cNvPicPr>
-          <p:nvPr/>
-        </p:nvPicPr>
-        <p:blipFill>
-          <a:blip r:embed="rId4"/>
-          <a:stretch>
-            <a:fillRect/>
-          </a:stretch>
-        </p:blipFill>
-        <p:spPr>
-          <a:xfrm>
-            <a:off x="0" y="5482525"/>
-            <a:ext cx="12192000" cy="2975675"/>
+            <a:off x="25400" y="0"/>
+            <a:ext cx="6604000" cy="4305300"/>
           </a:xfrm>
           <a:prstGeom prst="rect">
             <a:avLst/>
@@ -4326,7 +2999,7 @@
     </p:spTree>
     <p:extLst>
       <p:ext uri="{BB962C8B-B14F-4D97-AF65-F5344CB8AC3E}">
-        <p14:creationId xmlns:p14="http://schemas.microsoft.com/office/powerpoint/2010/main" val="216854848"/>
+        <p14:creationId xmlns:p14="http://schemas.microsoft.com/office/powerpoint/2010/main" val="156622338"/>
       </p:ext>
     </p:extLst>
   </p:cSld>

</xml_diff>